<commit_message>
update templates and vocabphrase feature
</commit_message>
<xml_diff>
--- a/exam2pptvideo/en/templates/exam_english_classic.pptx
+++ b/exam2pptvideo/en/templates/exam_english_classic.pptx
@@ -194,7 +194,7 @@
           <a:p>
             <a:fld id="{607E70D1-CD79-114F-AEE0-C37A9C943139}" type="datetimeFigureOut">
               <a:rPr kumimoji="1" lang="zh-CN" altLang="en-US" smtClean="0"/>
-              <a:t>2021/6/2</a:t>
+              <a:t>2021/6/13</a:t>
             </a:fld>
             <a:endParaRPr kumimoji="1" lang="zh-CN" altLang="en-US"/>
           </a:p>
@@ -1202,8 +1202,8 @@
         </p:nvSpPr>
         <p:spPr>
           <a:xfrm>
-            <a:off x="4872000" y="716076"/>
-            <a:ext cx="2448000" cy="403200"/>
+            <a:off x="6297887" y="738313"/>
+            <a:ext cx="1316242" cy="403200"/>
           </a:xfrm>
           <a:prstGeom prst="rect">
             <a:avLst/>
@@ -1212,7 +1212,7 @@
         <p:txBody>
           <a:bodyPr anchor="ctr"/>
           <a:lstStyle>
-            <a:lvl1pPr marL="0" indent="0" algn="ctr">
+            <a:lvl1pPr marL="0" indent="0" algn="l">
               <a:buFontTx/>
               <a:buNone/>
               <a:defRPr sz="2000">
@@ -1276,11 +1276,7 @@
           <a:p>
             <a:pPr lvl="0"/>
             <a:r>
-              <a:rPr kumimoji="1" lang="zh-CN" altLang="en-US" dirty="0" smtClean="0"/>
-              <a:t>正确解答：</a:t>
-            </a:r>
-            <a:r>
-              <a:rPr kumimoji="1" lang="en-US" altLang="zh-CN" dirty="0" smtClean="0"/>
+              <a:rPr kumimoji="1" lang="en-US" altLang="zh-CN" smtClean="0"/>
               <a:t>A</a:t>
             </a:r>
             <a:endParaRPr kumimoji="1" lang="zh-CN" altLang="en-US" dirty="0"/>
@@ -1695,7 +1691,7 @@
           <p:cNvPr id="16" name="文本框 6">
             <a:extLst>
               <a:ext uri="{FF2B5EF4-FFF2-40B4-BE49-F238E27FC236}">
-                <a16:creationId xmlns="" xmlns:a16="http://schemas.microsoft.com/office/drawing/2014/main" id="{5D38C703-0535-2649-B4A0-B8F05CF7B2C5}"/>
+                <a16:creationId xmlns:a16="http://schemas.microsoft.com/office/drawing/2014/main" xmlns="" id="{5D38C703-0535-2649-B4A0-B8F05CF7B2C5}"/>
               </a:ext>
             </a:extLst>
           </p:cNvPr>
@@ -1745,7 +1741,7 @@
           <p:cNvPr id="17" name="文本框 16">
             <a:extLst>
               <a:ext uri="{FF2B5EF4-FFF2-40B4-BE49-F238E27FC236}">
-                <a16:creationId xmlns="" xmlns:a16="http://schemas.microsoft.com/office/drawing/2014/main" id="{65E5CD98-D6C1-1848-86A2-A50598B55139}"/>
+                <a16:creationId xmlns:a16="http://schemas.microsoft.com/office/drawing/2014/main" xmlns="" id="{65E5CD98-D6C1-1848-86A2-A50598B55139}"/>
               </a:ext>
             </a:extLst>
           </p:cNvPr>
@@ -1795,7 +1791,7 @@
           <p:cNvPr id="18" name="文本框 6">
             <a:extLst>
               <a:ext uri="{FF2B5EF4-FFF2-40B4-BE49-F238E27FC236}">
-                <a16:creationId xmlns="" xmlns:a16="http://schemas.microsoft.com/office/drawing/2014/main" id="{5F9E940D-7090-E94B-8B49-5CA1D127071A}"/>
+                <a16:creationId xmlns:a16="http://schemas.microsoft.com/office/drawing/2014/main" xmlns="" id="{5F9E940D-7090-E94B-8B49-5CA1D127071A}"/>
               </a:ext>
             </a:extLst>
           </p:cNvPr>
@@ -1845,7 +1841,7 @@
           <p:cNvPr id="19" name="文本框 6">
             <a:extLst>
               <a:ext uri="{FF2B5EF4-FFF2-40B4-BE49-F238E27FC236}">
-                <a16:creationId xmlns="" xmlns:a16="http://schemas.microsoft.com/office/drawing/2014/main" id="{BB9196A1-74E2-5046-99D0-EB0B468753EC}"/>
+                <a16:creationId xmlns:a16="http://schemas.microsoft.com/office/drawing/2014/main" xmlns="" id="{BB9196A1-74E2-5046-99D0-EB0B468753EC}"/>
               </a:ext>
             </a:extLst>
           </p:cNvPr>
@@ -1914,9 +1910,21 @@
             <a:noAutofit/>
           </a:bodyPr>
           <a:lstStyle>
-            <a:lvl1pPr marL="0" indent="0" algn="l">
-              <a:buFontTx/>
-              <a:buNone/>
+            <a:lvl1pPr marL="0" marR="0" indent="0" algn="l" defTabSz="914400" rtl="0" eaLnBrk="1" fontAlgn="auto" latinLnBrk="0" hangingPunct="1">
+              <a:lnSpc>
+                <a:spcPct val="90000"/>
+              </a:lnSpc>
+              <a:spcBef>
+                <a:spcPts val="1000"/>
+              </a:spcBef>
+              <a:spcAft>
+                <a:spcPts val="0"/>
+              </a:spcAft>
+              <a:buClrTx/>
+              <a:buSzTx/>
+              <a:buFontTx/>
+              <a:buNone/>
+              <a:tabLst/>
               <a:defRPr sz="2000" baseline="0">
                 <a:solidFill>
                   <a:srgbClr val="ECFAFF"/>
@@ -1976,7 +1984,23 @@
             </a:lvl5pPr>
           </a:lstStyle>
           <a:p>
-            <a:pPr lvl="0"/>
+            <a:pPr marL="0" marR="0" lvl="0" indent="0" algn="l" defTabSz="914400" rtl="0" eaLnBrk="1" fontAlgn="auto" latinLnBrk="0" hangingPunct="1">
+              <a:lnSpc>
+                <a:spcPct val="90000"/>
+              </a:lnSpc>
+              <a:spcBef>
+                <a:spcPts val="1000"/>
+              </a:spcBef>
+              <a:spcAft>
+                <a:spcPts val="0"/>
+              </a:spcAft>
+              <a:buClrTx/>
+              <a:buSzTx/>
+              <a:buFontTx/>
+              <a:buNone/>
+              <a:tabLst/>
+              <a:defRPr/>
+            </a:pPr>
             <a:r>
               <a:rPr kumimoji="1" lang="en-US" altLang="zh-CN" dirty="0" smtClean="0"/>
               <a:t>Choice</a:t>
@@ -1989,7 +2013,18 @@
               <a:rPr kumimoji="1" lang="en-US" altLang="zh-CN" dirty="0" smtClean="0"/>
               <a:t>A</a:t>
             </a:r>
-            <a:endParaRPr kumimoji="1" lang="zh-CN" altLang="en-US" dirty="0"/>
+            <a:r>
+              <a:rPr kumimoji="1" lang="zh-CN" altLang="en-US" dirty="0" smtClean="0"/>
+              <a:t> </a:t>
+            </a:r>
+            <a:r>
+              <a:rPr kumimoji="1" lang="en-US" altLang="zh-CN" dirty="0" smtClean="0"/>
+              <a:t>+</a:t>
+            </a:r>
+            <a:r>
+              <a:rPr kumimoji="1" lang="zh-CN" altLang="en-US" dirty="0" smtClean="0"/>
+              <a:t> 释义</a:t>
+            </a:r>
           </a:p>
         </p:txBody>
       </p:sp>
@@ -2017,9 +2052,21 @@
             <a:noAutofit/>
           </a:bodyPr>
           <a:lstStyle>
-            <a:lvl1pPr marL="0" indent="0" algn="l">
-              <a:buFontTx/>
-              <a:buNone/>
+            <a:lvl1pPr marL="0" marR="0" indent="0" algn="l" defTabSz="914400" rtl="0" eaLnBrk="1" fontAlgn="auto" latinLnBrk="0" hangingPunct="1">
+              <a:lnSpc>
+                <a:spcPct val="90000"/>
+              </a:lnSpc>
+              <a:spcBef>
+                <a:spcPts val="1000"/>
+              </a:spcBef>
+              <a:spcAft>
+                <a:spcPts val="0"/>
+              </a:spcAft>
+              <a:buClrTx/>
+              <a:buSzTx/>
+              <a:buFontTx/>
+              <a:buNone/>
+              <a:tabLst/>
               <a:defRPr sz="2000" baseline="0">
                 <a:solidFill>
                   <a:srgbClr val="ECFAFF"/>
@@ -2079,7 +2126,23 @@
             </a:lvl5pPr>
           </a:lstStyle>
           <a:p>
-            <a:pPr lvl="0"/>
+            <a:pPr marL="0" marR="0" lvl="0" indent="0" algn="l" defTabSz="914400" rtl="0" eaLnBrk="1" fontAlgn="auto" latinLnBrk="0" hangingPunct="1">
+              <a:lnSpc>
+                <a:spcPct val="90000"/>
+              </a:lnSpc>
+              <a:spcBef>
+                <a:spcPts val="1000"/>
+              </a:spcBef>
+              <a:spcAft>
+                <a:spcPts val="0"/>
+              </a:spcAft>
+              <a:buClrTx/>
+              <a:buSzTx/>
+              <a:buFontTx/>
+              <a:buNone/>
+              <a:tabLst/>
+              <a:defRPr/>
+            </a:pPr>
             <a:r>
               <a:rPr kumimoji="1" lang="en-US" altLang="zh-CN" dirty="0" smtClean="0"/>
               <a:t>Choice</a:t>
@@ -2092,7 +2155,18 @@
               <a:rPr kumimoji="1" lang="en-US" altLang="zh-CN" dirty="0" smtClean="0"/>
               <a:t>B</a:t>
             </a:r>
-            <a:endParaRPr kumimoji="1" lang="zh-CN" altLang="en-US" dirty="0"/>
+            <a:r>
+              <a:rPr kumimoji="1" lang="zh-CN" altLang="en-US" dirty="0" smtClean="0"/>
+              <a:t> </a:t>
+            </a:r>
+            <a:r>
+              <a:rPr kumimoji="1" lang="en-US" altLang="zh-CN" dirty="0" smtClean="0"/>
+              <a:t>+</a:t>
+            </a:r>
+            <a:r>
+              <a:rPr kumimoji="1" lang="zh-CN" altLang="en-US" dirty="0" smtClean="0"/>
+              <a:t> 释义</a:t>
+            </a:r>
           </a:p>
         </p:txBody>
       </p:sp>
@@ -2120,9 +2194,21 @@
             <a:noAutofit/>
           </a:bodyPr>
           <a:lstStyle>
-            <a:lvl1pPr marL="0" indent="0" algn="l">
-              <a:buFontTx/>
-              <a:buNone/>
+            <a:lvl1pPr marL="0" marR="0" indent="0" algn="l" defTabSz="914400" rtl="0" eaLnBrk="1" fontAlgn="auto" latinLnBrk="0" hangingPunct="1">
+              <a:lnSpc>
+                <a:spcPct val="90000"/>
+              </a:lnSpc>
+              <a:spcBef>
+                <a:spcPts val="1000"/>
+              </a:spcBef>
+              <a:spcAft>
+                <a:spcPts val="0"/>
+              </a:spcAft>
+              <a:buClrTx/>
+              <a:buSzTx/>
+              <a:buFontTx/>
+              <a:buNone/>
+              <a:tabLst/>
               <a:defRPr sz="2000" baseline="0">
                 <a:solidFill>
                   <a:srgbClr val="ECFAFF"/>
@@ -2182,7 +2268,23 @@
             </a:lvl5pPr>
           </a:lstStyle>
           <a:p>
-            <a:pPr lvl="0"/>
+            <a:pPr marL="0" marR="0" lvl="0" indent="0" algn="l" defTabSz="914400" rtl="0" eaLnBrk="1" fontAlgn="auto" latinLnBrk="0" hangingPunct="1">
+              <a:lnSpc>
+                <a:spcPct val="90000"/>
+              </a:lnSpc>
+              <a:spcBef>
+                <a:spcPts val="1000"/>
+              </a:spcBef>
+              <a:spcAft>
+                <a:spcPts val="0"/>
+              </a:spcAft>
+              <a:buClrTx/>
+              <a:buSzTx/>
+              <a:buFontTx/>
+              <a:buNone/>
+              <a:tabLst/>
+              <a:defRPr/>
+            </a:pPr>
             <a:r>
               <a:rPr kumimoji="1" lang="en-US" altLang="zh-CN" dirty="0" smtClean="0"/>
               <a:t>Choice</a:t>
@@ -2195,7 +2297,18 @@
               <a:rPr kumimoji="1" lang="en-US" altLang="zh-CN" dirty="0" smtClean="0"/>
               <a:t>C</a:t>
             </a:r>
-            <a:endParaRPr kumimoji="1" lang="zh-CN" altLang="en-US" dirty="0"/>
+            <a:r>
+              <a:rPr kumimoji="1" lang="zh-CN" altLang="en-US" dirty="0" smtClean="0"/>
+              <a:t> </a:t>
+            </a:r>
+            <a:r>
+              <a:rPr kumimoji="1" lang="en-US" altLang="zh-CN" dirty="0" smtClean="0"/>
+              <a:t>+</a:t>
+            </a:r>
+            <a:r>
+              <a:rPr kumimoji="1" lang="zh-CN" altLang="en-US" dirty="0" smtClean="0"/>
+              <a:t> 释义</a:t>
+            </a:r>
           </a:p>
         </p:txBody>
       </p:sp>
@@ -2223,9 +2336,21 @@
             <a:noAutofit/>
           </a:bodyPr>
           <a:lstStyle>
-            <a:lvl1pPr marL="0" indent="0" algn="l">
-              <a:buFontTx/>
-              <a:buNone/>
+            <a:lvl1pPr marL="0" marR="0" indent="0" algn="l" defTabSz="914400" rtl="0" eaLnBrk="1" fontAlgn="auto" latinLnBrk="0" hangingPunct="1">
+              <a:lnSpc>
+                <a:spcPct val="90000"/>
+              </a:lnSpc>
+              <a:spcBef>
+                <a:spcPts val="1000"/>
+              </a:spcBef>
+              <a:spcAft>
+                <a:spcPts val="0"/>
+              </a:spcAft>
+              <a:buClrTx/>
+              <a:buSzTx/>
+              <a:buFontTx/>
+              <a:buNone/>
+              <a:tabLst/>
               <a:defRPr sz="2000" baseline="0">
                 <a:solidFill>
                   <a:srgbClr val="ECFAFF"/>
@@ -2285,7 +2410,23 @@
             </a:lvl5pPr>
           </a:lstStyle>
           <a:p>
-            <a:pPr lvl="0"/>
+            <a:pPr marL="0" marR="0" lvl="0" indent="0" algn="l" defTabSz="914400" rtl="0" eaLnBrk="1" fontAlgn="auto" latinLnBrk="0" hangingPunct="1">
+              <a:lnSpc>
+                <a:spcPct val="90000"/>
+              </a:lnSpc>
+              <a:spcBef>
+                <a:spcPts val="1000"/>
+              </a:spcBef>
+              <a:spcAft>
+                <a:spcPts val="0"/>
+              </a:spcAft>
+              <a:buClrTx/>
+              <a:buSzTx/>
+              <a:buFontTx/>
+              <a:buNone/>
+              <a:tabLst/>
+              <a:defRPr/>
+            </a:pPr>
             <a:r>
               <a:rPr kumimoji="1" lang="en-US" altLang="zh-CN" dirty="0" smtClean="0"/>
               <a:t>Choice</a:t>
@@ -2298,7 +2439,85 @@
               <a:rPr kumimoji="1" lang="en-US" altLang="zh-CN" dirty="0" smtClean="0"/>
               <a:t>D</a:t>
             </a:r>
-            <a:endParaRPr kumimoji="1" lang="zh-CN" altLang="en-US" dirty="0"/>
+            <a:r>
+              <a:rPr kumimoji="1" lang="zh-CN" altLang="en-US" dirty="0" smtClean="0"/>
+              <a:t> </a:t>
+            </a:r>
+            <a:r>
+              <a:rPr kumimoji="1" lang="en-US" altLang="zh-CN" dirty="0" smtClean="0"/>
+              <a:t>+</a:t>
+            </a:r>
+            <a:r>
+              <a:rPr kumimoji="1" lang="zh-CN" altLang="en-US" smtClean="0"/>
+              <a:t> 释义</a:t>
+            </a:r>
+          </a:p>
+        </p:txBody>
+      </p:sp>
+      <p:sp>
+        <p:nvSpPr>
+          <p:cNvPr id="20" name="文本框 19"/>
+          <p:cNvSpPr txBox="1"/>
+          <p:nvPr userDrawn="1"/>
+        </p:nvSpPr>
+        <p:spPr>
+          <a:xfrm>
+            <a:off x="5048572" y="739858"/>
+            <a:ext cx="1722618" cy="400110"/>
+          </a:xfrm>
+          <a:prstGeom prst="rect">
+            <a:avLst/>
+          </a:prstGeom>
+          <a:noFill/>
+        </p:spPr>
+        <p:txBody>
+          <a:bodyPr wrap="square" rtlCol="0" anchor="ctr">
+            <a:spAutoFit/>
+          </a:bodyPr>
+          <a:lstStyle/>
+          <a:p>
+            <a:pPr marL="0" marR="0" indent="0" algn="l" defTabSz="914400" rtl="0" eaLnBrk="1" fontAlgn="auto" latinLnBrk="0" hangingPunct="1">
+              <a:lnSpc>
+                <a:spcPct val="100000"/>
+              </a:lnSpc>
+              <a:spcBef>
+                <a:spcPts val="0"/>
+              </a:spcBef>
+              <a:spcAft>
+                <a:spcPts val="0"/>
+              </a:spcAft>
+              <a:buClrTx/>
+              <a:buSzTx/>
+              <a:buFontTx/>
+              <a:buNone/>
+              <a:tabLst/>
+              <a:defRPr/>
+            </a:pPr>
+            <a:r>
+              <a:rPr kumimoji="1" lang="zh-CN" altLang="en-US" sz="2000" b="0" i="0" u="none" strike="noStrike" kern="1200" cap="none" spc="0" normalizeH="0" baseline="0" noProof="0" dirty="0" smtClean="0">
+                <a:ln>
+                  <a:noFill/>
+                </a:ln>
+                <a:solidFill>
+                  <a:srgbClr val="ECFAFF"/>
+                </a:solidFill>
+                <a:effectLst/>
+                <a:uLnTx/>
+                <a:uFillTx/>
+                <a:latin typeface="PingFang SC" charset="-122"/>
+                <a:ea typeface="PingFang SC" charset="-122"/>
+                <a:cs typeface="PingFang SC" charset="-122"/>
+              </a:rPr>
+              <a:t>正确解答：</a:t>
+            </a:r>
+            <a:endParaRPr kumimoji="1" lang="zh-CN" altLang="en-US" sz="2000" dirty="0">
+              <a:solidFill>
+                <a:srgbClr val="ECFAFF"/>
+              </a:solidFill>
+              <a:latin typeface="PingFang SC" charset="-122"/>
+              <a:ea typeface="PingFang SC" charset="-122"/>
+              <a:cs typeface="PingFang SC" charset="-122"/>
+            </a:endParaRPr>
           </a:p>
         </p:txBody>
       </p:sp>
@@ -2306,6 +2525,2638 @@
     <p:extLst>
       <p:ext uri="{BB962C8B-B14F-4D97-AF65-F5344CB8AC3E}">
         <p14:creationId xmlns:p14="http://schemas.microsoft.com/office/powerpoint/2010/main" val="1315485378"/>
+      </p:ext>
+    </p:extLst>
+  </p:cSld>
+  <p:clrMapOvr>
+    <a:masterClrMapping/>
+  </p:clrMapOvr>
+</p:sldLayout>
+</file>
+
+<file path=ppt/slideLayouts/slideLayout12.xml><?xml version="1.0" encoding="utf-8"?>
+<p:sldLayout xmlns:a="http://schemas.openxmlformats.org/drawingml/2006/main" xmlns:r="http://schemas.openxmlformats.org/officeDocument/2006/relationships" xmlns:p="http://schemas.openxmlformats.org/presentationml/2006/main" preserve="1" userDrawn="1">
+  <p:cSld name="VocabPhrase with choices">
+    <p:spTree>
+      <p:nvGrpSpPr>
+        <p:cNvPr id="1" name=""/>
+        <p:cNvGrpSpPr/>
+        <p:nvPr/>
+      </p:nvGrpSpPr>
+      <p:grpSpPr>
+        <a:xfrm>
+          <a:off x="0" y="0"/>
+          <a:ext cx="0" cy="0"/>
+          <a:chOff x="0" y="0"/>
+          <a:chExt cx="0" cy="0"/>
+        </a:xfrm>
+      </p:grpSpPr>
+      <p:sp>
+        <p:nvSpPr>
+          <p:cNvPr id="3" name="文本占位符 2"/>
+          <p:cNvSpPr>
+            <a:spLocks noGrp="1"/>
+          </p:cNvSpPr>
+          <p:nvPr>
+            <p:ph type="body" sz="quarter" idx="10" hasCustomPrompt="1"/>
+          </p:nvPr>
+        </p:nvSpPr>
+        <p:spPr>
+          <a:xfrm>
+            <a:off x="531758" y="680672"/>
+            <a:ext cx="1728000" cy="518482"/>
+          </a:xfrm>
+          <a:prstGeom prst="rect">
+            <a:avLst/>
+          </a:prstGeom>
+        </p:spPr>
+        <p:txBody>
+          <a:bodyPr/>
+          <a:lstStyle>
+            <a:lvl1pPr marL="0" indent="0">
+              <a:buFontTx/>
+              <a:buNone/>
+              <a:defRPr sz="3200" b="0" i="0">
+                <a:solidFill>
+                  <a:srgbClr val="ECFAFF">
+                    <a:alpha val="50000"/>
+                  </a:srgbClr>
+                </a:solidFill>
+                <a:latin typeface="Helvetica Neue Medium" charset="0"/>
+                <a:ea typeface="Helvetica Neue Medium" charset="0"/>
+                <a:cs typeface="Helvetica Neue Medium" charset="0"/>
+              </a:defRPr>
+            </a:lvl1pPr>
+          </a:lstStyle>
+          <a:p>
+            <a:pPr marL="228600" marR="0" lvl="0" indent="-228600" algn="l" defTabSz="914400" rtl="0" eaLnBrk="1" fontAlgn="auto" latinLnBrk="0" hangingPunct="1">
+              <a:lnSpc>
+                <a:spcPct val="90000"/>
+              </a:lnSpc>
+              <a:spcBef>
+                <a:spcPts val="1000"/>
+              </a:spcBef>
+              <a:spcAft>
+                <a:spcPts val="0"/>
+              </a:spcAft>
+              <a:buClrTx/>
+              <a:buSzTx/>
+              <a:buFont typeface="Arial"/>
+              <a:buNone/>
+              <a:tabLst/>
+              <a:defRPr/>
+            </a:pPr>
+            <a:r>
+              <a:rPr kumimoji="1" lang="en-US" altLang="zh-CN" dirty="0" smtClean="0"/>
+              <a:t>Q.1</a:t>
+            </a:r>
+            <a:endParaRPr kumimoji="1" lang="zh-CN" altLang="en-US" dirty="0"/>
+          </a:p>
+        </p:txBody>
+      </p:sp>
+      <p:sp>
+        <p:nvSpPr>
+          <p:cNvPr id="4" name="文本占位符 4"/>
+          <p:cNvSpPr>
+            <a:spLocks noGrp="1"/>
+          </p:cNvSpPr>
+          <p:nvPr>
+            <p:ph type="body" sz="quarter" idx="11" hasCustomPrompt="1"/>
+          </p:nvPr>
+        </p:nvSpPr>
+        <p:spPr>
+          <a:xfrm>
+            <a:off x="531758" y="1199154"/>
+            <a:ext cx="11128486" cy="1800000"/>
+          </a:xfrm>
+          <a:prstGeom prst="rect">
+            <a:avLst/>
+          </a:prstGeom>
+        </p:spPr>
+        <p:txBody>
+          <a:bodyPr anchor="ctr" anchorCtr="0">
+            <a:normAutofit/>
+          </a:bodyPr>
+          <a:lstStyle>
+            <a:lvl1pPr marL="0" indent="0" algn="ctr">
+              <a:lnSpc>
+                <a:spcPct val="120000"/>
+              </a:lnSpc>
+              <a:buFontTx/>
+              <a:buNone/>
+              <a:defRPr sz="6000">
+                <a:solidFill>
+                  <a:srgbClr val="ECFAFF"/>
+                </a:solidFill>
+                <a:latin typeface="PingFang SC" charset="-122"/>
+                <a:ea typeface="PingFang SC" charset="-122"/>
+                <a:cs typeface="PingFang SC" charset="-122"/>
+              </a:defRPr>
+            </a:lvl1pPr>
+            <a:lvl2pPr marL="457200" indent="0" algn="ctr">
+              <a:lnSpc>
+                <a:spcPct val="120000"/>
+              </a:lnSpc>
+              <a:buFontTx/>
+              <a:buNone/>
+              <a:defRPr>
+                <a:solidFill>
+                  <a:srgbClr val="ECFAFF"/>
+                </a:solidFill>
+                <a:latin typeface="PingFang SC" charset="-122"/>
+                <a:ea typeface="PingFang SC" charset="-122"/>
+                <a:cs typeface="PingFang SC" charset="-122"/>
+              </a:defRPr>
+            </a:lvl2pPr>
+            <a:lvl3pPr marL="914400" indent="0" algn="ctr">
+              <a:lnSpc>
+                <a:spcPct val="120000"/>
+              </a:lnSpc>
+              <a:buFontTx/>
+              <a:buNone/>
+              <a:defRPr>
+                <a:solidFill>
+                  <a:srgbClr val="ECFAFF"/>
+                </a:solidFill>
+                <a:latin typeface="PingFang SC" charset="-122"/>
+                <a:ea typeface="PingFang SC" charset="-122"/>
+                <a:cs typeface="PingFang SC" charset="-122"/>
+              </a:defRPr>
+            </a:lvl3pPr>
+            <a:lvl4pPr marL="1371600" indent="0" algn="ctr">
+              <a:lnSpc>
+                <a:spcPct val="120000"/>
+              </a:lnSpc>
+              <a:buFontTx/>
+              <a:buNone/>
+              <a:defRPr>
+                <a:solidFill>
+                  <a:srgbClr val="ECFAFF"/>
+                </a:solidFill>
+                <a:latin typeface="PingFang SC" charset="-122"/>
+                <a:ea typeface="PingFang SC" charset="-122"/>
+                <a:cs typeface="PingFang SC" charset="-122"/>
+              </a:defRPr>
+            </a:lvl4pPr>
+            <a:lvl5pPr marL="1828800" indent="0" algn="ctr">
+              <a:lnSpc>
+                <a:spcPct val="120000"/>
+              </a:lnSpc>
+              <a:buFontTx/>
+              <a:buNone/>
+              <a:defRPr>
+                <a:solidFill>
+                  <a:srgbClr val="ECFAFF"/>
+                </a:solidFill>
+                <a:latin typeface="PingFang SC" charset="-122"/>
+                <a:ea typeface="PingFang SC" charset="-122"/>
+                <a:cs typeface="PingFang SC" charset="-122"/>
+              </a:defRPr>
+            </a:lvl5pPr>
+          </a:lstStyle>
+          <a:p>
+            <a:pPr lvl="0"/>
+            <a:r>
+              <a:rPr kumimoji="1" lang="zh-CN" altLang="en-US" dirty="0" smtClean="0"/>
+              <a:t>球</a:t>
+            </a:r>
+            <a:endParaRPr kumimoji="1" lang="zh-CN" altLang="en-US" dirty="0"/>
+          </a:p>
+        </p:txBody>
+      </p:sp>
+      <p:sp>
+        <p:nvSpPr>
+          <p:cNvPr id="5" name="文本占位符 13"/>
+          <p:cNvSpPr>
+            <a:spLocks noGrp="1"/>
+          </p:cNvSpPr>
+          <p:nvPr>
+            <p:ph type="body" sz="quarter" idx="12" hasCustomPrompt="1"/>
+          </p:nvPr>
+        </p:nvSpPr>
+        <p:spPr>
+          <a:xfrm>
+            <a:off x="531758" y="3161241"/>
+            <a:ext cx="11128484" cy="496359"/>
+          </a:xfrm>
+          <a:prstGeom prst="rect">
+            <a:avLst/>
+          </a:prstGeom>
+        </p:spPr>
+        <p:txBody>
+          <a:bodyPr anchor="ctr" anchorCtr="0"/>
+          <a:lstStyle>
+            <a:lvl1pPr marL="0" indent="0" algn="ctr">
+              <a:lnSpc>
+                <a:spcPct val="120000"/>
+              </a:lnSpc>
+              <a:buFontTx/>
+              <a:buNone/>
+              <a:defRPr sz="2000">
+                <a:solidFill>
+                  <a:schemeClr val="bg1"/>
+                </a:solidFill>
+                <a:latin typeface="PingFang SC" charset="-122"/>
+                <a:ea typeface="PingFang SC" charset="-122"/>
+                <a:cs typeface="PingFang SC" charset="-122"/>
+              </a:defRPr>
+            </a:lvl1pPr>
+            <a:lvl2pPr marL="457200" indent="0" algn="ctr">
+              <a:lnSpc>
+                <a:spcPct val="120000"/>
+              </a:lnSpc>
+              <a:buFontTx/>
+              <a:buNone/>
+              <a:defRPr>
+                <a:solidFill>
+                  <a:srgbClr val="ECFAFF"/>
+                </a:solidFill>
+                <a:latin typeface="PingFang SC" charset="-122"/>
+                <a:ea typeface="PingFang SC" charset="-122"/>
+                <a:cs typeface="PingFang SC" charset="-122"/>
+              </a:defRPr>
+            </a:lvl2pPr>
+            <a:lvl3pPr marL="914400" indent="0" algn="ctr">
+              <a:lnSpc>
+                <a:spcPct val="120000"/>
+              </a:lnSpc>
+              <a:buFontTx/>
+              <a:buNone/>
+              <a:defRPr>
+                <a:solidFill>
+                  <a:srgbClr val="ECFAFF"/>
+                </a:solidFill>
+                <a:latin typeface="PingFang SC" charset="-122"/>
+                <a:ea typeface="PingFang SC" charset="-122"/>
+                <a:cs typeface="PingFang SC" charset="-122"/>
+              </a:defRPr>
+            </a:lvl3pPr>
+            <a:lvl4pPr marL="1371600" indent="0" algn="ctr">
+              <a:lnSpc>
+                <a:spcPct val="120000"/>
+              </a:lnSpc>
+              <a:buFontTx/>
+              <a:buNone/>
+              <a:defRPr>
+                <a:solidFill>
+                  <a:srgbClr val="ECFAFF"/>
+                </a:solidFill>
+                <a:latin typeface="PingFang SC" charset="-122"/>
+                <a:ea typeface="PingFang SC" charset="-122"/>
+                <a:cs typeface="PingFang SC" charset="-122"/>
+              </a:defRPr>
+            </a:lvl4pPr>
+            <a:lvl5pPr marL="1828800" indent="0" algn="ctr">
+              <a:lnSpc>
+                <a:spcPct val="120000"/>
+              </a:lnSpc>
+              <a:buFontTx/>
+              <a:buNone/>
+              <a:defRPr>
+                <a:solidFill>
+                  <a:srgbClr val="ECFAFF"/>
+                </a:solidFill>
+                <a:latin typeface="PingFang SC" charset="-122"/>
+                <a:ea typeface="PingFang SC" charset="-122"/>
+                <a:cs typeface="PingFang SC" charset="-122"/>
+              </a:defRPr>
+            </a:lvl5pPr>
+          </a:lstStyle>
+          <a:p>
+            <a:pPr lvl="0"/>
+            <a:r>
+              <a:rPr kumimoji="1" lang="zh-CN" altLang="en-US" dirty="0" smtClean="0"/>
+              <a:t>考点：</a:t>
+            </a:r>
+            <a:r>
+              <a:rPr kumimoji="1" lang="en-US" altLang="zh-CN" dirty="0" smtClean="0"/>
+              <a:t>A2</a:t>
+            </a:r>
+            <a:r>
+              <a:rPr kumimoji="1" lang="zh-CN" altLang="en-US" dirty="0" smtClean="0"/>
+              <a:t> </a:t>
+            </a:r>
+            <a:r>
+              <a:rPr kumimoji="1" lang="en-US" altLang="zh-CN" dirty="0" smtClean="0"/>
+              <a:t>–</a:t>
+            </a:r>
+            <a:r>
+              <a:rPr kumimoji="1" lang="zh-CN" altLang="en-US" dirty="0" smtClean="0"/>
+              <a:t> 运动</a:t>
+            </a:r>
+            <a:endParaRPr kumimoji="1" lang="zh-CN" altLang="en-US" dirty="0"/>
+          </a:p>
+        </p:txBody>
+      </p:sp>
+      <p:sp>
+        <p:nvSpPr>
+          <p:cNvPr id="6" name="矩形 5"/>
+          <p:cNvSpPr/>
+          <p:nvPr userDrawn="1"/>
+        </p:nvSpPr>
+        <p:spPr>
+          <a:xfrm>
+            <a:off x="531758" y="5182543"/>
+            <a:ext cx="5472000" cy="724284"/>
+          </a:xfrm>
+          <a:prstGeom prst="rect">
+            <a:avLst/>
+          </a:prstGeom>
+          <a:solidFill>
+            <a:srgbClr val="ECFAFF">
+              <a:alpha val="9000"/>
+            </a:srgbClr>
+          </a:solidFill>
+          <a:ln>
+            <a:solidFill>
+              <a:srgbClr val="ECFAFF">
+                <a:alpha val="40000"/>
+              </a:srgbClr>
+            </a:solidFill>
+          </a:ln>
+        </p:spPr>
+        <p:style>
+          <a:lnRef idx="2">
+            <a:schemeClr val="accent1"/>
+          </a:lnRef>
+          <a:fillRef idx="1">
+            <a:schemeClr val="lt1"/>
+          </a:fillRef>
+          <a:effectRef idx="0">
+            <a:schemeClr val="accent1"/>
+          </a:effectRef>
+          <a:fontRef idx="minor">
+            <a:schemeClr val="dk1"/>
+          </a:fontRef>
+        </p:style>
+        <p:txBody>
+          <a:bodyPr rtlCol="0" anchor="ctr"/>
+          <a:lstStyle/>
+          <a:p>
+            <a:pPr algn="ctr"/>
+            <a:endParaRPr kumimoji="1" lang="zh-CN" altLang="en-US" dirty="0"/>
+          </a:p>
+        </p:txBody>
+      </p:sp>
+      <p:sp>
+        <p:nvSpPr>
+          <p:cNvPr id="7" name="矩形 6"/>
+          <p:cNvSpPr/>
+          <p:nvPr userDrawn="1"/>
+        </p:nvSpPr>
+        <p:spPr>
+          <a:xfrm>
+            <a:off x="6188242" y="5182543"/>
+            <a:ext cx="5472000" cy="724284"/>
+          </a:xfrm>
+          <a:prstGeom prst="rect">
+            <a:avLst/>
+          </a:prstGeom>
+          <a:solidFill>
+            <a:srgbClr val="ECFAFF">
+              <a:alpha val="9000"/>
+            </a:srgbClr>
+          </a:solidFill>
+          <a:ln>
+            <a:solidFill>
+              <a:srgbClr val="ECFAFF">
+                <a:alpha val="40000"/>
+              </a:srgbClr>
+            </a:solidFill>
+          </a:ln>
+        </p:spPr>
+        <p:style>
+          <a:lnRef idx="2">
+            <a:schemeClr val="accent1"/>
+          </a:lnRef>
+          <a:fillRef idx="1">
+            <a:schemeClr val="lt1"/>
+          </a:fillRef>
+          <a:effectRef idx="0">
+            <a:schemeClr val="accent1"/>
+          </a:effectRef>
+          <a:fontRef idx="minor">
+            <a:schemeClr val="dk1"/>
+          </a:fontRef>
+        </p:style>
+        <p:txBody>
+          <a:bodyPr rtlCol="0" anchor="ctr"/>
+          <a:lstStyle/>
+          <a:p>
+            <a:pPr algn="ctr"/>
+            <a:endParaRPr kumimoji="1" lang="zh-CN" altLang="en-US" dirty="0"/>
+          </a:p>
+        </p:txBody>
+      </p:sp>
+      <p:sp>
+        <p:nvSpPr>
+          <p:cNvPr id="8" name="矩形 7"/>
+          <p:cNvSpPr/>
+          <p:nvPr userDrawn="1"/>
+        </p:nvSpPr>
+        <p:spPr>
+          <a:xfrm>
+            <a:off x="531758" y="4225627"/>
+            <a:ext cx="5472000" cy="724284"/>
+          </a:xfrm>
+          <a:prstGeom prst="rect">
+            <a:avLst/>
+          </a:prstGeom>
+          <a:solidFill>
+            <a:srgbClr val="ECFAFF">
+              <a:alpha val="9000"/>
+            </a:srgbClr>
+          </a:solidFill>
+          <a:ln>
+            <a:solidFill>
+              <a:srgbClr val="ECFAFF">
+                <a:alpha val="40000"/>
+              </a:srgbClr>
+            </a:solidFill>
+          </a:ln>
+        </p:spPr>
+        <p:style>
+          <a:lnRef idx="2">
+            <a:schemeClr val="accent1"/>
+          </a:lnRef>
+          <a:fillRef idx="1">
+            <a:schemeClr val="lt1"/>
+          </a:fillRef>
+          <a:effectRef idx="0">
+            <a:schemeClr val="accent1"/>
+          </a:effectRef>
+          <a:fontRef idx="minor">
+            <a:schemeClr val="dk1"/>
+          </a:fontRef>
+        </p:style>
+        <p:txBody>
+          <a:bodyPr rtlCol="0" anchor="ctr"/>
+          <a:lstStyle/>
+          <a:p>
+            <a:pPr algn="ctr"/>
+            <a:endParaRPr kumimoji="1" lang="zh-CN" altLang="en-US" dirty="0"/>
+          </a:p>
+        </p:txBody>
+      </p:sp>
+      <p:sp>
+        <p:nvSpPr>
+          <p:cNvPr id="9" name="矩形 8"/>
+          <p:cNvSpPr/>
+          <p:nvPr userDrawn="1"/>
+        </p:nvSpPr>
+        <p:spPr>
+          <a:xfrm>
+            <a:off x="6188242" y="4225627"/>
+            <a:ext cx="5472000" cy="724284"/>
+          </a:xfrm>
+          <a:prstGeom prst="rect">
+            <a:avLst/>
+          </a:prstGeom>
+          <a:solidFill>
+            <a:srgbClr val="ECFAFF">
+              <a:alpha val="9000"/>
+            </a:srgbClr>
+          </a:solidFill>
+          <a:ln>
+            <a:solidFill>
+              <a:srgbClr val="ECFAFF">
+                <a:alpha val="40000"/>
+              </a:srgbClr>
+            </a:solidFill>
+          </a:ln>
+        </p:spPr>
+        <p:style>
+          <a:lnRef idx="2">
+            <a:schemeClr val="accent1"/>
+          </a:lnRef>
+          <a:fillRef idx="1">
+            <a:schemeClr val="lt1"/>
+          </a:fillRef>
+          <a:effectRef idx="0">
+            <a:schemeClr val="accent1"/>
+          </a:effectRef>
+          <a:fontRef idx="minor">
+            <a:schemeClr val="dk1"/>
+          </a:fontRef>
+        </p:style>
+        <p:txBody>
+          <a:bodyPr rtlCol="0" anchor="ctr"/>
+          <a:lstStyle/>
+          <a:p>
+            <a:pPr algn="ctr"/>
+            <a:endParaRPr kumimoji="1" lang="zh-CN" altLang="en-US" dirty="0"/>
+          </a:p>
+        </p:txBody>
+      </p:sp>
+      <p:sp>
+        <p:nvSpPr>
+          <p:cNvPr id="10" name="文本框 6">
+            <a:extLst>
+              <a:ext uri="{FF2B5EF4-FFF2-40B4-BE49-F238E27FC236}">
+                <a16:creationId xmlns:a16="http://schemas.microsoft.com/office/drawing/2014/main" xmlns="" id="{5D38C703-0535-2649-B4A0-B8F05CF7B2C5}"/>
+              </a:ext>
+            </a:extLst>
+          </p:cNvPr>
+          <p:cNvSpPr txBox="1"/>
+          <p:nvPr userDrawn="1"/>
+        </p:nvSpPr>
+        <p:spPr>
+          <a:xfrm>
+            <a:off x="1971758" y="4387714"/>
+            <a:ext cx="548810" cy="400110"/>
+          </a:xfrm>
+          <a:prstGeom prst="rect">
+            <a:avLst/>
+          </a:prstGeom>
+          <a:noFill/>
+        </p:spPr>
+        <p:txBody>
+          <a:bodyPr wrap="square" rtlCol="0" anchor="ctr" anchorCtr="0">
+            <a:spAutoFit/>
+          </a:bodyPr>
+          <a:lstStyle/>
+          <a:p>
+            <a:r>
+              <a:rPr kumimoji="1" lang="en-US" altLang="zh-CN" sz="2000" b="0" i="0" dirty="0">
+                <a:solidFill>
+                  <a:srgbClr val="ECFAFF"/>
+                </a:solidFill>
+                <a:latin typeface="PingFang SC" charset="-122"/>
+                <a:ea typeface="PingFang SC" charset="-122"/>
+                <a:cs typeface="PingFang SC" charset="-122"/>
+              </a:rPr>
+              <a:t>A.</a:t>
+            </a:r>
+            <a:endParaRPr kumimoji="1" lang="zh-CN" altLang="en-US" sz="2000" b="0" i="0" dirty="0">
+              <a:solidFill>
+                <a:srgbClr val="ECFAFF"/>
+              </a:solidFill>
+              <a:latin typeface="PingFang SC" charset="-122"/>
+              <a:ea typeface="PingFang SC" charset="-122"/>
+              <a:cs typeface="PingFang SC" charset="-122"/>
+            </a:endParaRPr>
+          </a:p>
+        </p:txBody>
+      </p:sp>
+      <p:sp>
+        <p:nvSpPr>
+          <p:cNvPr id="11" name="文本框 10">
+            <a:extLst>
+              <a:ext uri="{FF2B5EF4-FFF2-40B4-BE49-F238E27FC236}">
+                <a16:creationId xmlns:a16="http://schemas.microsoft.com/office/drawing/2014/main" xmlns="" id="{65E5CD98-D6C1-1848-86A2-A50598B55139}"/>
+              </a:ext>
+            </a:extLst>
+          </p:cNvPr>
+          <p:cNvSpPr txBox="1"/>
+          <p:nvPr userDrawn="1"/>
+        </p:nvSpPr>
+        <p:spPr>
+          <a:xfrm>
+            <a:off x="1971758" y="5344630"/>
+            <a:ext cx="548810" cy="400110"/>
+          </a:xfrm>
+          <a:prstGeom prst="rect">
+            <a:avLst/>
+          </a:prstGeom>
+          <a:noFill/>
+        </p:spPr>
+        <p:txBody>
+          <a:bodyPr wrap="square" rtlCol="0" anchor="ctr" anchorCtr="0">
+            <a:spAutoFit/>
+          </a:bodyPr>
+          <a:lstStyle/>
+          <a:p>
+            <a:r>
+              <a:rPr kumimoji="1" lang="en-US" altLang="zh-CN" sz="2000" b="0" i="0" dirty="0">
+                <a:solidFill>
+                  <a:srgbClr val="ECFAFF"/>
+                </a:solidFill>
+                <a:latin typeface="PingFang SC" charset="-122"/>
+                <a:ea typeface="PingFang SC" charset="-122"/>
+                <a:cs typeface="PingFang SC" charset="-122"/>
+              </a:rPr>
+              <a:t>C.</a:t>
+            </a:r>
+            <a:endParaRPr kumimoji="1" lang="zh-CN" altLang="en-US" sz="2000" b="0" i="0" dirty="0">
+              <a:solidFill>
+                <a:srgbClr val="ECFAFF"/>
+              </a:solidFill>
+              <a:latin typeface="PingFang SC" charset="-122"/>
+              <a:ea typeface="PingFang SC" charset="-122"/>
+              <a:cs typeface="PingFang SC" charset="-122"/>
+            </a:endParaRPr>
+          </a:p>
+        </p:txBody>
+      </p:sp>
+      <p:sp>
+        <p:nvSpPr>
+          <p:cNvPr id="12" name="文本框 6">
+            <a:extLst>
+              <a:ext uri="{FF2B5EF4-FFF2-40B4-BE49-F238E27FC236}">
+                <a16:creationId xmlns:a16="http://schemas.microsoft.com/office/drawing/2014/main" xmlns="" id="{5F9E940D-7090-E94B-8B49-5CA1D127071A}"/>
+              </a:ext>
+            </a:extLst>
+          </p:cNvPr>
+          <p:cNvSpPr txBox="1"/>
+          <p:nvPr userDrawn="1"/>
+        </p:nvSpPr>
+        <p:spPr>
+          <a:xfrm>
+            <a:off x="7614129" y="4387714"/>
+            <a:ext cx="548810" cy="400110"/>
+          </a:xfrm>
+          <a:prstGeom prst="rect">
+            <a:avLst/>
+          </a:prstGeom>
+          <a:noFill/>
+        </p:spPr>
+        <p:txBody>
+          <a:bodyPr wrap="square" rtlCol="0" anchor="ctr" anchorCtr="0">
+            <a:spAutoFit/>
+          </a:bodyPr>
+          <a:lstStyle/>
+          <a:p>
+            <a:r>
+              <a:rPr kumimoji="1" lang="en-US" altLang="zh-CN" sz="2000" b="0" i="0" dirty="0">
+                <a:solidFill>
+                  <a:srgbClr val="ECFAFF"/>
+                </a:solidFill>
+                <a:latin typeface="PingFang SC" charset="-122"/>
+                <a:ea typeface="PingFang SC" charset="-122"/>
+                <a:cs typeface="PingFang SC" charset="-122"/>
+              </a:rPr>
+              <a:t>B.</a:t>
+            </a:r>
+            <a:endParaRPr kumimoji="1" lang="zh-CN" altLang="en-US" sz="2000" b="0" i="0" dirty="0">
+              <a:solidFill>
+                <a:srgbClr val="ECFAFF"/>
+              </a:solidFill>
+              <a:latin typeface="PingFang SC" charset="-122"/>
+              <a:ea typeface="PingFang SC" charset="-122"/>
+              <a:cs typeface="PingFang SC" charset="-122"/>
+            </a:endParaRPr>
+          </a:p>
+        </p:txBody>
+      </p:sp>
+      <p:sp>
+        <p:nvSpPr>
+          <p:cNvPr id="13" name="文本框 6">
+            <a:extLst>
+              <a:ext uri="{FF2B5EF4-FFF2-40B4-BE49-F238E27FC236}">
+                <a16:creationId xmlns:a16="http://schemas.microsoft.com/office/drawing/2014/main" xmlns="" id="{BB9196A1-74E2-5046-99D0-EB0B468753EC}"/>
+              </a:ext>
+            </a:extLst>
+          </p:cNvPr>
+          <p:cNvSpPr txBox="1"/>
+          <p:nvPr userDrawn="1"/>
+        </p:nvSpPr>
+        <p:spPr>
+          <a:xfrm>
+            <a:off x="7614129" y="5344630"/>
+            <a:ext cx="548810" cy="400110"/>
+          </a:xfrm>
+          <a:prstGeom prst="rect">
+            <a:avLst/>
+          </a:prstGeom>
+          <a:noFill/>
+        </p:spPr>
+        <p:txBody>
+          <a:bodyPr wrap="square" rtlCol="0" anchor="ctr" anchorCtr="0">
+            <a:spAutoFit/>
+          </a:bodyPr>
+          <a:lstStyle/>
+          <a:p>
+            <a:r>
+              <a:rPr kumimoji="1" lang="en-US" altLang="zh-CN" sz="2000" b="0" i="0" dirty="0">
+                <a:solidFill>
+                  <a:srgbClr val="ECFAFF"/>
+                </a:solidFill>
+                <a:latin typeface="PingFang SC" charset="-122"/>
+                <a:ea typeface="PingFang SC" charset="-122"/>
+                <a:cs typeface="PingFang SC" charset="-122"/>
+              </a:rPr>
+              <a:t>D.</a:t>
+            </a:r>
+            <a:endParaRPr kumimoji="1" lang="zh-CN" altLang="en-US" sz="2000" b="0" i="0" dirty="0">
+              <a:solidFill>
+                <a:srgbClr val="ECFAFF"/>
+              </a:solidFill>
+              <a:latin typeface="PingFang SC" charset="-122"/>
+              <a:ea typeface="PingFang SC" charset="-122"/>
+              <a:cs typeface="PingFang SC" charset="-122"/>
+            </a:endParaRPr>
+          </a:p>
+        </p:txBody>
+      </p:sp>
+      <p:sp>
+        <p:nvSpPr>
+          <p:cNvPr id="15" name="文本占位符 14"/>
+          <p:cNvSpPr>
+            <a:spLocks noGrp="1"/>
+          </p:cNvSpPr>
+          <p:nvPr>
+            <p:ph type="body" sz="quarter" idx="13" hasCustomPrompt="1"/>
+          </p:nvPr>
+        </p:nvSpPr>
+        <p:spPr>
+          <a:xfrm>
+            <a:off x="2398992" y="4387715"/>
+            <a:ext cx="3205293" cy="400109"/>
+          </a:xfrm>
+          <a:prstGeom prst="rect">
+            <a:avLst/>
+          </a:prstGeom>
+        </p:spPr>
+        <p:txBody>
+          <a:bodyPr anchor="ctr"/>
+          <a:lstStyle>
+            <a:lvl1pPr marL="0" indent="0">
+              <a:buFontTx/>
+              <a:buNone/>
+              <a:defRPr sz="2000">
+                <a:solidFill>
+                  <a:srgbClr val="ECFAFF"/>
+                </a:solidFill>
+                <a:latin typeface="PingFang SC" charset="-122"/>
+                <a:ea typeface="PingFang SC" charset="-122"/>
+                <a:cs typeface="PingFang SC" charset="-122"/>
+              </a:defRPr>
+            </a:lvl1pPr>
+            <a:lvl2pPr marL="457200" indent="0">
+              <a:buFontTx/>
+              <a:buNone/>
+              <a:defRPr sz="2000">
+                <a:solidFill>
+                  <a:srgbClr val="ECFAFF"/>
+                </a:solidFill>
+                <a:latin typeface="PingFang SC" charset="-122"/>
+                <a:ea typeface="PingFang SC" charset="-122"/>
+                <a:cs typeface="PingFang SC" charset="-122"/>
+              </a:defRPr>
+            </a:lvl2pPr>
+            <a:lvl3pPr marL="914400" indent="0">
+              <a:buFontTx/>
+              <a:buNone/>
+              <a:defRPr sz="2000">
+                <a:solidFill>
+                  <a:srgbClr val="ECFAFF"/>
+                </a:solidFill>
+                <a:latin typeface="PingFang SC" charset="-122"/>
+                <a:ea typeface="PingFang SC" charset="-122"/>
+                <a:cs typeface="PingFang SC" charset="-122"/>
+              </a:defRPr>
+            </a:lvl3pPr>
+            <a:lvl4pPr marL="1371600" indent="0">
+              <a:buFontTx/>
+              <a:buNone/>
+              <a:defRPr sz="2000">
+                <a:solidFill>
+                  <a:srgbClr val="ECFAFF"/>
+                </a:solidFill>
+                <a:latin typeface="PingFang SC" charset="-122"/>
+                <a:ea typeface="PingFang SC" charset="-122"/>
+                <a:cs typeface="PingFang SC" charset="-122"/>
+              </a:defRPr>
+            </a:lvl4pPr>
+            <a:lvl5pPr marL="1828800" indent="0">
+              <a:buFontTx/>
+              <a:buNone/>
+              <a:defRPr sz="2000">
+                <a:solidFill>
+                  <a:srgbClr val="ECFAFF"/>
+                </a:solidFill>
+                <a:latin typeface="PingFang SC" charset="-122"/>
+                <a:ea typeface="PingFang SC" charset="-122"/>
+                <a:cs typeface="PingFang SC" charset="-122"/>
+              </a:defRPr>
+            </a:lvl5pPr>
+          </a:lstStyle>
+          <a:p>
+            <a:pPr lvl="0"/>
+            <a:r>
+              <a:rPr kumimoji="1" lang="en-US" altLang="zh-CN" dirty="0" smtClean="0"/>
+              <a:t>Choice</a:t>
+            </a:r>
+            <a:r>
+              <a:rPr kumimoji="1" lang="zh-CN" altLang="en-US" dirty="0" smtClean="0"/>
+              <a:t> </a:t>
+            </a:r>
+            <a:r>
+              <a:rPr kumimoji="1" lang="en-US" altLang="zh-CN" dirty="0" smtClean="0"/>
+              <a:t>A</a:t>
+            </a:r>
+            <a:endParaRPr kumimoji="1" lang="zh-CN" altLang="en-US" dirty="0"/>
+          </a:p>
+        </p:txBody>
+      </p:sp>
+      <p:sp>
+        <p:nvSpPr>
+          <p:cNvPr id="16" name="文本占位符 14"/>
+          <p:cNvSpPr>
+            <a:spLocks noGrp="1"/>
+          </p:cNvSpPr>
+          <p:nvPr>
+            <p:ph type="body" sz="quarter" idx="14" hasCustomPrompt="1"/>
+          </p:nvPr>
+        </p:nvSpPr>
+        <p:spPr>
+          <a:xfrm>
+            <a:off x="8072999" y="4387715"/>
+            <a:ext cx="3205293" cy="400109"/>
+          </a:xfrm>
+          <a:prstGeom prst="rect">
+            <a:avLst/>
+          </a:prstGeom>
+        </p:spPr>
+        <p:txBody>
+          <a:bodyPr anchor="ctr"/>
+          <a:lstStyle>
+            <a:lvl1pPr marL="0" indent="0">
+              <a:buFontTx/>
+              <a:buNone/>
+              <a:defRPr sz="2000">
+                <a:solidFill>
+                  <a:srgbClr val="ECFAFF"/>
+                </a:solidFill>
+                <a:latin typeface="PingFang SC" charset="-122"/>
+                <a:ea typeface="PingFang SC" charset="-122"/>
+                <a:cs typeface="PingFang SC" charset="-122"/>
+              </a:defRPr>
+            </a:lvl1pPr>
+            <a:lvl2pPr marL="457200" indent="0">
+              <a:buFontTx/>
+              <a:buNone/>
+              <a:defRPr sz="2000">
+                <a:solidFill>
+                  <a:srgbClr val="ECFAFF"/>
+                </a:solidFill>
+                <a:latin typeface="PingFang SC" charset="-122"/>
+                <a:ea typeface="PingFang SC" charset="-122"/>
+                <a:cs typeface="PingFang SC" charset="-122"/>
+              </a:defRPr>
+            </a:lvl2pPr>
+            <a:lvl3pPr marL="914400" indent="0">
+              <a:buFontTx/>
+              <a:buNone/>
+              <a:defRPr sz="2000">
+                <a:solidFill>
+                  <a:srgbClr val="ECFAFF"/>
+                </a:solidFill>
+                <a:latin typeface="PingFang SC" charset="-122"/>
+                <a:ea typeface="PingFang SC" charset="-122"/>
+                <a:cs typeface="PingFang SC" charset="-122"/>
+              </a:defRPr>
+            </a:lvl3pPr>
+            <a:lvl4pPr marL="1371600" indent="0">
+              <a:buFontTx/>
+              <a:buNone/>
+              <a:defRPr sz="2000">
+                <a:solidFill>
+                  <a:srgbClr val="ECFAFF"/>
+                </a:solidFill>
+                <a:latin typeface="PingFang SC" charset="-122"/>
+                <a:ea typeface="PingFang SC" charset="-122"/>
+                <a:cs typeface="PingFang SC" charset="-122"/>
+              </a:defRPr>
+            </a:lvl4pPr>
+            <a:lvl5pPr marL="1828800" indent="0">
+              <a:buFontTx/>
+              <a:buNone/>
+              <a:defRPr sz="2000">
+                <a:solidFill>
+                  <a:srgbClr val="ECFAFF"/>
+                </a:solidFill>
+                <a:latin typeface="PingFang SC" charset="-122"/>
+                <a:ea typeface="PingFang SC" charset="-122"/>
+                <a:cs typeface="PingFang SC" charset="-122"/>
+              </a:defRPr>
+            </a:lvl5pPr>
+          </a:lstStyle>
+          <a:p>
+            <a:pPr lvl="0"/>
+            <a:r>
+              <a:rPr kumimoji="1" lang="en-US" altLang="zh-CN" dirty="0" smtClean="0"/>
+              <a:t>Choice</a:t>
+            </a:r>
+            <a:r>
+              <a:rPr kumimoji="1" lang="zh-CN" altLang="en-US" dirty="0" smtClean="0"/>
+              <a:t> </a:t>
+            </a:r>
+            <a:r>
+              <a:rPr kumimoji="1" lang="en-US" altLang="zh-CN" dirty="0" smtClean="0"/>
+              <a:t>B</a:t>
+            </a:r>
+            <a:endParaRPr kumimoji="1" lang="zh-CN" altLang="en-US" dirty="0"/>
+          </a:p>
+        </p:txBody>
+      </p:sp>
+      <p:sp>
+        <p:nvSpPr>
+          <p:cNvPr id="17" name="文本占位符 14"/>
+          <p:cNvSpPr>
+            <a:spLocks noGrp="1"/>
+          </p:cNvSpPr>
+          <p:nvPr>
+            <p:ph type="body" sz="quarter" idx="15" hasCustomPrompt="1"/>
+          </p:nvPr>
+        </p:nvSpPr>
+        <p:spPr>
+          <a:xfrm>
+            <a:off x="2398992" y="5344631"/>
+            <a:ext cx="3205293" cy="400109"/>
+          </a:xfrm>
+          <a:prstGeom prst="rect">
+            <a:avLst/>
+          </a:prstGeom>
+        </p:spPr>
+        <p:txBody>
+          <a:bodyPr anchor="ctr"/>
+          <a:lstStyle>
+            <a:lvl1pPr marL="0" indent="0">
+              <a:buFontTx/>
+              <a:buNone/>
+              <a:defRPr sz="2000">
+                <a:solidFill>
+                  <a:srgbClr val="ECFAFF"/>
+                </a:solidFill>
+                <a:latin typeface="PingFang SC" charset="-122"/>
+                <a:ea typeface="PingFang SC" charset="-122"/>
+                <a:cs typeface="PingFang SC" charset="-122"/>
+              </a:defRPr>
+            </a:lvl1pPr>
+            <a:lvl2pPr marL="457200" indent="0">
+              <a:buFontTx/>
+              <a:buNone/>
+              <a:defRPr sz="2000">
+                <a:solidFill>
+                  <a:srgbClr val="ECFAFF"/>
+                </a:solidFill>
+                <a:latin typeface="PingFang SC" charset="-122"/>
+                <a:ea typeface="PingFang SC" charset="-122"/>
+                <a:cs typeface="PingFang SC" charset="-122"/>
+              </a:defRPr>
+            </a:lvl2pPr>
+            <a:lvl3pPr marL="914400" indent="0">
+              <a:buFontTx/>
+              <a:buNone/>
+              <a:defRPr sz="2000">
+                <a:solidFill>
+                  <a:srgbClr val="ECFAFF"/>
+                </a:solidFill>
+                <a:latin typeface="PingFang SC" charset="-122"/>
+                <a:ea typeface="PingFang SC" charset="-122"/>
+                <a:cs typeface="PingFang SC" charset="-122"/>
+              </a:defRPr>
+            </a:lvl3pPr>
+            <a:lvl4pPr marL="1371600" indent="0">
+              <a:buFontTx/>
+              <a:buNone/>
+              <a:defRPr sz="2000">
+                <a:solidFill>
+                  <a:srgbClr val="ECFAFF"/>
+                </a:solidFill>
+                <a:latin typeface="PingFang SC" charset="-122"/>
+                <a:ea typeface="PingFang SC" charset="-122"/>
+                <a:cs typeface="PingFang SC" charset="-122"/>
+              </a:defRPr>
+            </a:lvl4pPr>
+            <a:lvl5pPr marL="1828800" indent="0">
+              <a:buFontTx/>
+              <a:buNone/>
+              <a:defRPr sz="2000">
+                <a:solidFill>
+                  <a:srgbClr val="ECFAFF"/>
+                </a:solidFill>
+                <a:latin typeface="PingFang SC" charset="-122"/>
+                <a:ea typeface="PingFang SC" charset="-122"/>
+                <a:cs typeface="PingFang SC" charset="-122"/>
+              </a:defRPr>
+            </a:lvl5pPr>
+          </a:lstStyle>
+          <a:p>
+            <a:pPr lvl="0"/>
+            <a:r>
+              <a:rPr kumimoji="1" lang="en-US" altLang="zh-CN" dirty="0" smtClean="0"/>
+              <a:t>Choice</a:t>
+            </a:r>
+            <a:r>
+              <a:rPr kumimoji="1" lang="zh-CN" altLang="en-US" dirty="0" smtClean="0"/>
+              <a:t> </a:t>
+            </a:r>
+            <a:r>
+              <a:rPr kumimoji="1" lang="en-US" altLang="zh-CN" dirty="0" smtClean="0"/>
+              <a:t>C</a:t>
+            </a:r>
+            <a:endParaRPr kumimoji="1" lang="zh-CN" altLang="en-US" dirty="0"/>
+          </a:p>
+        </p:txBody>
+      </p:sp>
+      <p:sp>
+        <p:nvSpPr>
+          <p:cNvPr id="18" name="文本占位符 14"/>
+          <p:cNvSpPr>
+            <a:spLocks noGrp="1"/>
+          </p:cNvSpPr>
+          <p:nvPr>
+            <p:ph type="body" sz="quarter" idx="16" hasCustomPrompt="1"/>
+          </p:nvPr>
+        </p:nvSpPr>
+        <p:spPr>
+          <a:xfrm>
+            <a:off x="8072999" y="5344631"/>
+            <a:ext cx="3205293" cy="400109"/>
+          </a:xfrm>
+          <a:prstGeom prst="rect">
+            <a:avLst/>
+          </a:prstGeom>
+        </p:spPr>
+        <p:txBody>
+          <a:bodyPr anchor="ctr"/>
+          <a:lstStyle>
+            <a:lvl1pPr marL="0" indent="0">
+              <a:buFontTx/>
+              <a:buNone/>
+              <a:defRPr sz="2000">
+                <a:solidFill>
+                  <a:srgbClr val="ECFAFF"/>
+                </a:solidFill>
+                <a:latin typeface="PingFang SC" charset="-122"/>
+                <a:ea typeface="PingFang SC" charset="-122"/>
+                <a:cs typeface="PingFang SC" charset="-122"/>
+              </a:defRPr>
+            </a:lvl1pPr>
+            <a:lvl2pPr marL="457200" indent="0">
+              <a:buFontTx/>
+              <a:buNone/>
+              <a:defRPr sz="2000">
+                <a:solidFill>
+                  <a:srgbClr val="ECFAFF"/>
+                </a:solidFill>
+                <a:latin typeface="PingFang SC" charset="-122"/>
+                <a:ea typeface="PingFang SC" charset="-122"/>
+                <a:cs typeface="PingFang SC" charset="-122"/>
+              </a:defRPr>
+            </a:lvl2pPr>
+            <a:lvl3pPr marL="914400" indent="0">
+              <a:buFontTx/>
+              <a:buNone/>
+              <a:defRPr sz="2000">
+                <a:solidFill>
+                  <a:srgbClr val="ECFAFF"/>
+                </a:solidFill>
+                <a:latin typeface="PingFang SC" charset="-122"/>
+                <a:ea typeface="PingFang SC" charset="-122"/>
+                <a:cs typeface="PingFang SC" charset="-122"/>
+              </a:defRPr>
+            </a:lvl3pPr>
+            <a:lvl4pPr marL="1371600" indent="0">
+              <a:buFontTx/>
+              <a:buNone/>
+              <a:defRPr sz="2000">
+                <a:solidFill>
+                  <a:srgbClr val="ECFAFF"/>
+                </a:solidFill>
+                <a:latin typeface="PingFang SC" charset="-122"/>
+                <a:ea typeface="PingFang SC" charset="-122"/>
+                <a:cs typeface="PingFang SC" charset="-122"/>
+              </a:defRPr>
+            </a:lvl4pPr>
+            <a:lvl5pPr marL="1828800" indent="0">
+              <a:buFontTx/>
+              <a:buNone/>
+              <a:defRPr sz="2000">
+                <a:solidFill>
+                  <a:srgbClr val="ECFAFF"/>
+                </a:solidFill>
+                <a:latin typeface="PingFang SC" charset="-122"/>
+                <a:ea typeface="PingFang SC" charset="-122"/>
+                <a:cs typeface="PingFang SC" charset="-122"/>
+              </a:defRPr>
+            </a:lvl5pPr>
+          </a:lstStyle>
+          <a:p>
+            <a:pPr lvl="0"/>
+            <a:r>
+              <a:rPr kumimoji="1" lang="en-US" altLang="zh-CN" dirty="0" smtClean="0"/>
+              <a:t>Choice</a:t>
+            </a:r>
+            <a:r>
+              <a:rPr kumimoji="1" lang="zh-CN" altLang="en-US" dirty="0" smtClean="0"/>
+              <a:t> </a:t>
+            </a:r>
+            <a:r>
+              <a:rPr kumimoji="1" lang="en-US" altLang="zh-CN" dirty="0" smtClean="0"/>
+              <a:t>D</a:t>
+            </a:r>
+            <a:endParaRPr kumimoji="1" lang="zh-CN" altLang="en-US" dirty="0"/>
+          </a:p>
+        </p:txBody>
+      </p:sp>
+    </p:spTree>
+    <p:extLst>
+      <p:ext uri="{BB962C8B-B14F-4D97-AF65-F5344CB8AC3E}">
+        <p14:creationId xmlns:p14="http://schemas.microsoft.com/office/powerpoint/2010/main" val="778216869"/>
+      </p:ext>
+    </p:extLst>
+  </p:cSld>
+  <p:clrMapOvr>
+    <a:masterClrMapping/>
+  </p:clrMapOvr>
+</p:sldLayout>
+</file>
+
+<file path=ppt/slideLayouts/slideLayout13.xml><?xml version="1.0" encoding="utf-8"?>
+<p:sldLayout xmlns:a="http://schemas.openxmlformats.org/drawingml/2006/main" xmlns:r="http://schemas.openxmlformats.org/officeDocument/2006/relationships" xmlns:p="http://schemas.openxmlformats.org/presentationml/2006/main" preserve="1" userDrawn="1">
+  <p:cSld name="VocabPhrase analysis with choices">
+    <p:spTree>
+      <p:nvGrpSpPr>
+        <p:cNvPr id="1" name=""/>
+        <p:cNvGrpSpPr/>
+        <p:nvPr/>
+      </p:nvGrpSpPr>
+      <p:grpSpPr>
+        <a:xfrm>
+          <a:off x="0" y="0"/>
+          <a:ext cx="0" cy="0"/>
+          <a:chOff x="0" y="0"/>
+          <a:chExt cx="0" cy="0"/>
+        </a:xfrm>
+      </p:grpSpPr>
+      <p:sp>
+        <p:nvSpPr>
+          <p:cNvPr id="3" name="文本占位符 2"/>
+          <p:cNvSpPr>
+            <a:spLocks noGrp="1"/>
+          </p:cNvSpPr>
+          <p:nvPr>
+            <p:ph type="body" sz="quarter" idx="10" hasCustomPrompt="1"/>
+          </p:nvPr>
+        </p:nvSpPr>
+        <p:spPr>
+          <a:xfrm>
+            <a:off x="531758" y="680672"/>
+            <a:ext cx="1728000" cy="518482"/>
+          </a:xfrm>
+          <a:prstGeom prst="rect">
+            <a:avLst/>
+          </a:prstGeom>
+        </p:spPr>
+        <p:txBody>
+          <a:bodyPr/>
+          <a:lstStyle>
+            <a:lvl1pPr marL="0" indent="0">
+              <a:buFontTx/>
+              <a:buNone/>
+              <a:defRPr sz="3200" b="0" i="0">
+                <a:solidFill>
+                  <a:srgbClr val="ECFAFF">
+                    <a:alpha val="50000"/>
+                  </a:srgbClr>
+                </a:solidFill>
+                <a:latin typeface="Helvetica Neue Medium" charset="0"/>
+                <a:ea typeface="Helvetica Neue Medium" charset="0"/>
+                <a:cs typeface="Helvetica Neue Medium" charset="0"/>
+              </a:defRPr>
+            </a:lvl1pPr>
+          </a:lstStyle>
+          <a:p>
+            <a:pPr marL="228600" marR="0" lvl="0" indent="-228600" algn="l" defTabSz="914400" rtl="0" eaLnBrk="1" fontAlgn="auto" latinLnBrk="0" hangingPunct="1">
+              <a:lnSpc>
+                <a:spcPct val="90000"/>
+              </a:lnSpc>
+              <a:spcBef>
+                <a:spcPts val="1000"/>
+              </a:spcBef>
+              <a:spcAft>
+                <a:spcPts val="0"/>
+              </a:spcAft>
+              <a:buClrTx/>
+              <a:buSzTx/>
+              <a:buFont typeface="Arial"/>
+              <a:buNone/>
+              <a:tabLst/>
+              <a:defRPr/>
+            </a:pPr>
+            <a:r>
+              <a:rPr kumimoji="1" lang="en-US" altLang="zh-CN" dirty="0" smtClean="0"/>
+              <a:t>Q.1</a:t>
+            </a:r>
+            <a:endParaRPr kumimoji="1" lang="zh-CN" altLang="en-US" dirty="0"/>
+          </a:p>
+        </p:txBody>
+      </p:sp>
+      <p:sp>
+        <p:nvSpPr>
+          <p:cNvPr id="4" name="文本占位符 6"/>
+          <p:cNvSpPr>
+            <a:spLocks noGrp="1"/>
+          </p:cNvSpPr>
+          <p:nvPr>
+            <p:ph type="body" sz="quarter" idx="11" hasCustomPrompt="1"/>
+          </p:nvPr>
+        </p:nvSpPr>
+        <p:spPr>
+          <a:xfrm>
+            <a:off x="6395285" y="738313"/>
+            <a:ext cx="1218844" cy="403200"/>
+          </a:xfrm>
+          <a:prstGeom prst="rect">
+            <a:avLst/>
+          </a:prstGeom>
+        </p:spPr>
+        <p:txBody>
+          <a:bodyPr anchor="ctr"/>
+          <a:lstStyle>
+            <a:lvl1pPr marL="0" indent="0" algn="l">
+              <a:buFontTx/>
+              <a:buNone/>
+              <a:defRPr sz="2000">
+                <a:solidFill>
+                  <a:srgbClr val="ECFAFF"/>
+                </a:solidFill>
+                <a:latin typeface="PingFang SC" charset="-122"/>
+                <a:ea typeface="PingFang SC" charset="-122"/>
+                <a:cs typeface="PingFang SC" charset="-122"/>
+              </a:defRPr>
+            </a:lvl1pPr>
+            <a:lvl2pPr marL="457200" indent="0" algn="ctr">
+              <a:buFontTx/>
+              <a:buNone/>
+              <a:defRPr sz="2000">
+                <a:solidFill>
+                  <a:srgbClr val="ECFAFF"/>
+                </a:solidFill>
+                <a:latin typeface="PingFang SC" charset="-122"/>
+                <a:ea typeface="PingFang SC" charset="-122"/>
+                <a:cs typeface="PingFang SC" charset="-122"/>
+              </a:defRPr>
+            </a:lvl2pPr>
+            <a:lvl3pPr marL="914400" indent="0" algn="ctr">
+              <a:buFontTx/>
+              <a:buNone/>
+              <a:defRPr sz="2000">
+                <a:solidFill>
+                  <a:srgbClr val="ECFAFF"/>
+                </a:solidFill>
+                <a:latin typeface="PingFang SC" charset="-122"/>
+                <a:ea typeface="PingFang SC" charset="-122"/>
+                <a:cs typeface="PingFang SC" charset="-122"/>
+              </a:defRPr>
+            </a:lvl3pPr>
+            <a:lvl4pPr marL="1371600" indent="0" algn="ctr">
+              <a:buFontTx/>
+              <a:buNone/>
+              <a:defRPr sz="2000">
+                <a:solidFill>
+                  <a:srgbClr val="ECFAFF"/>
+                </a:solidFill>
+                <a:latin typeface="PingFang SC" charset="-122"/>
+                <a:ea typeface="PingFang SC" charset="-122"/>
+                <a:cs typeface="PingFang SC" charset="-122"/>
+              </a:defRPr>
+            </a:lvl4pPr>
+            <a:lvl5pPr marL="1828800" indent="0" algn="ctr">
+              <a:buFontTx/>
+              <a:buNone/>
+              <a:defRPr sz="2000">
+                <a:solidFill>
+                  <a:srgbClr val="ECFAFF"/>
+                </a:solidFill>
+                <a:latin typeface="PingFang SC" charset="-122"/>
+                <a:ea typeface="PingFang SC" charset="-122"/>
+                <a:cs typeface="PingFang SC" charset="-122"/>
+              </a:defRPr>
+            </a:lvl5pPr>
+          </a:lstStyle>
+          <a:p>
+            <a:pPr lvl="0"/>
+            <a:r>
+              <a:rPr kumimoji="1" lang="en-US" altLang="zh-CN" dirty="0" smtClean="0"/>
+              <a:t>A</a:t>
+            </a:r>
+            <a:endParaRPr kumimoji="1" lang="zh-CN" altLang="en-US" dirty="0"/>
+          </a:p>
+        </p:txBody>
+      </p:sp>
+      <p:sp>
+        <p:nvSpPr>
+          <p:cNvPr id="5" name="文本占位符 8"/>
+          <p:cNvSpPr>
+            <a:spLocks noGrp="1"/>
+          </p:cNvSpPr>
+          <p:nvPr>
+            <p:ph type="body" sz="quarter" idx="12" hasCustomPrompt="1"/>
+          </p:nvPr>
+        </p:nvSpPr>
+        <p:spPr>
+          <a:xfrm>
+            <a:off x="531758" y="1199153"/>
+            <a:ext cx="11128484" cy="1584000"/>
+          </a:xfrm>
+          <a:prstGeom prst="rect">
+            <a:avLst/>
+          </a:prstGeom>
+        </p:spPr>
+        <p:txBody>
+          <a:bodyPr anchor="ctr">
+            <a:normAutofit/>
+          </a:bodyPr>
+          <a:lstStyle>
+            <a:lvl1pPr marL="0" indent="0" algn="ctr">
+              <a:lnSpc>
+                <a:spcPct val="120000"/>
+              </a:lnSpc>
+              <a:buFontTx/>
+              <a:buNone/>
+              <a:defRPr sz="6000">
+                <a:solidFill>
+                  <a:srgbClr val="ECFAFF"/>
+                </a:solidFill>
+                <a:latin typeface="PingFang SC" charset="-122"/>
+                <a:ea typeface="PingFang SC" charset="-122"/>
+                <a:cs typeface="PingFang SC" charset="-122"/>
+              </a:defRPr>
+            </a:lvl1pPr>
+            <a:lvl2pPr marL="457200" indent="0" algn="ctr">
+              <a:buFontTx/>
+              <a:buNone/>
+              <a:defRPr>
+                <a:solidFill>
+                  <a:srgbClr val="ECFAFF"/>
+                </a:solidFill>
+                <a:latin typeface="PingFang SC" charset="-122"/>
+                <a:ea typeface="PingFang SC" charset="-122"/>
+                <a:cs typeface="PingFang SC" charset="-122"/>
+              </a:defRPr>
+            </a:lvl2pPr>
+            <a:lvl3pPr marL="914400" indent="0" algn="ctr">
+              <a:buFontTx/>
+              <a:buNone/>
+              <a:defRPr>
+                <a:solidFill>
+                  <a:srgbClr val="ECFAFF"/>
+                </a:solidFill>
+                <a:latin typeface="PingFang SC" charset="-122"/>
+                <a:ea typeface="PingFang SC" charset="-122"/>
+                <a:cs typeface="PingFang SC" charset="-122"/>
+              </a:defRPr>
+            </a:lvl3pPr>
+            <a:lvl4pPr marL="1371600" indent="0" algn="ctr">
+              <a:buFontTx/>
+              <a:buNone/>
+              <a:defRPr>
+                <a:solidFill>
+                  <a:srgbClr val="ECFAFF"/>
+                </a:solidFill>
+                <a:latin typeface="PingFang SC" charset="-122"/>
+                <a:ea typeface="PingFang SC" charset="-122"/>
+                <a:cs typeface="PingFang SC" charset="-122"/>
+              </a:defRPr>
+            </a:lvl4pPr>
+            <a:lvl5pPr marL="1828800" indent="0" algn="ctr">
+              <a:buFontTx/>
+              <a:buNone/>
+              <a:defRPr>
+                <a:solidFill>
+                  <a:srgbClr val="ECFAFF"/>
+                </a:solidFill>
+                <a:latin typeface="PingFang SC" charset="-122"/>
+                <a:ea typeface="PingFang SC" charset="-122"/>
+                <a:cs typeface="PingFang SC" charset="-122"/>
+              </a:defRPr>
+            </a:lvl5pPr>
+          </a:lstStyle>
+          <a:p>
+            <a:pPr lvl="0"/>
+            <a:r>
+              <a:rPr kumimoji="1" lang="zh-CN" altLang="en-US" dirty="0" smtClean="0"/>
+              <a:t>球 </a:t>
+            </a:r>
+            <a:r>
+              <a:rPr kumimoji="1" lang="en-US" altLang="zh-CN" dirty="0" smtClean="0"/>
+              <a:t>ball</a:t>
+            </a:r>
+            <a:endParaRPr kumimoji="1" lang="zh-CN" altLang="en-US" dirty="0"/>
+          </a:p>
+        </p:txBody>
+      </p:sp>
+      <p:sp>
+        <p:nvSpPr>
+          <p:cNvPr id="6" name="文本占位符 10"/>
+          <p:cNvSpPr>
+            <a:spLocks noGrp="1"/>
+          </p:cNvSpPr>
+          <p:nvPr>
+            <p:ph type="body" sz="quarter" idx="13" hasCustomPrompt="1"/>
+          </p:nvPr>
+        </p:nvSpPr>
+        <p:spPr>
+          <a:xfrm>
+            <a:off x="531758" y="2863030"/>
+            <a:ext cx="11128484" cy="484243"/>
+          </a:xfrm>
+          <a:prstGeom prst="rect">
+            <a:avLst/>
+          </a:prstGeom>
+        </p:spPr>
+        <p:txBody>
+          <a:bodyPr anchor="ctr"/>
+          <a:lstStyle>
+            <a:lvl1pPr marL="0" indent="0" algn="ctr">
+              <a:buFontTx/>
+              <a:buNone/>
+              <a:defRPr sz="2000">
+                <a:solidFill>
+                  <a:srgbClr val="ECFAFF"/>
+                </a:solidFill>
+                <a:latin typeface="PingFang SC" charset="-122"/>
+                <a:ea typeface="PingFang SC" charset="-122"/>
+                <a:cs typeface="PingFang SC" charset="-122"/>
+              </a:defRPr>
+            </a:lvl1pPr>
+            <a:lvl2pPr marL="457200" indent="0" algn="ctr">
+              <a:buFontTx/>
+              <a:buNone/>
+              <a:defRPr sz="2000">
+                <a:solidFill>
+                  <a:srgbClr val="ECFAFF"/>
+                </a:solidFill>
+                <a:latin typeface="PingFang SC" charset="-122"/>
+                <a:ea typeface="PingFang SC" charset="-122"/>
+                <a:cs typeface="PingFang SC" charset="-122"/>
+              </a:defRPr>
+            </a:lvl2pPr>
+            <a:lvl3pPr marL="914400" indent="0" algn="ctr">
+              <a:buFontTx/>
+              <a:buNone/>
+              <a:defRPr sz="2000">
+                <a:solidFill>
+                  <a:srgbClr val="ECFAFF"/>
+                </a:solidFill>
+                <a:latin typeface="PingFang SC" charset="-122"/>
+                <a:ea typeface="PingFang SC" charset="-122"/>
+                <a:cs typeface="PingFang SC" charset="-122"/>
+              </a:defRPr>
+            </a:lvl3pPr>
+            <a:lvl4pPr marL="1371600" indent="0" algn="ctr">
+              <a:buFontTx/>
+              <a:buNone/>
+              <a:defRPr sz="2000">
+                <a:solidFill>
+                  <a:srgbClr val="ECFAFF"/>
+                </a:solidFill>
+                <a:latin typeface="PingFang SC" charset="-122"/>
+                <a:ea typeface="PingFang SC" charset="-122"/>
+                <a:cs typeface="PingFang SC" charset="-122"/>
+              </a:defRPr>
+            </a:lvl4pPr>
+            <a:lvl5pPr marL="1828800" indent="0" algn="ctr">
+              <a:buFontTx/>
+              <a:buNone/>
+              <a:defRPr sz="2000">
+                <a:solidFill>
+                  <a:srgbClr val="ECFAFF"/>
+                </a:solidFill>
+                <a:latin typeface="PingFang SC" charset="-122"/>
+                <a:ea typeface="PingFang SC" charset="-122"/>
+                <a:cs typeface="PingFang SC" charset="-122"/>
+              </a:defRPr>
+            </a:lvl5pPr>
+          </a:lstStyle>
+          <a:p>
+            <a:pPr lvl="0"/>
+            <a:r>
+              <a:rPr kumimoji="1" lang="zh-CN" altLang="en-US" dirty="0" smtClean="0"/>
+              <a:t>考点：</a:t>
+            </a:r>
+            <a:r>
+              <a:rPr kumimoji="1" lang="en-US" altLang="zh-CN" dirty="0" smtClean="0"/>
+              <a:t>A1-</a:t>
+            </a:r>
+            <a:r>
+              <a:rPr kumimoji="1" lang="zh-CN" altLang="en-US" dirty="0" smtClean="0"/>
+              <a:t>运动</a:t>
+            </a:r>
+            <a:endParaRPr kumimoji="1" lang="zh-CN" altLang="en-US" dirty="0"/>
+          </a:p>
+        </p:txBody>
+      </p:sp>
+      <p:sp>
+        <p:nvSpPr>
+          <p:cNvPr id="7" name="矩形 6"/>
+          <p:cNvSpPr/>
+          <p:nvPr userDrawn="1"/>
+        </p:nvSpPr>
+        <p:spPr>
+          <a:xfrm>
+            <a:off x="531758" y="4600066"/>
+            <a:ext cx="5472000" cy="724284"/>
+          </a:xfrm>
+          <a:prstGeom prst="rect">
+            <a:avLst/>
+          </a:prstGeom>
+          <a:solidFill>
+            <a:srgbClr val="ECFAFF">
+              <a:alpha val="9000"/>
+            </a:srgbClr>
+          </a:solidFill>
+          <a:ln>
+            <a:solidFill>
+              <a:srgbClr val="ECFAFF">
+                <a:alpha val="40000"/>
+              </a:srgbClr>
+            </a:solidFill>
+          </a:ln>
+        </p:spPr>
+        <p:style>
+          <a:lnRef idx="2">
+            <a:schemeClr val="accent1"/>
+          </a:lnRef>
+          <a:fillRef idx="1">
+            <a:schemeClr val="lt1"/>
+          </a:fillRef>
+          <a:effectRef idx="0">
+            <a:schemeClr val="accent1"/>
+          </a:effectRef>
+          <a:fontRef idx="minor">
+            <a:schemeClr val="dk1"/>
+          </a:fontRef>
+        </p:style>
+        <p:txBody>
+          <a:bodyPr rtlCol="0" anchor="ctr"/>
+          <a:lstStyle/>
+          <a:p>
+            <a:pPr algn="ctr"/>
+            <a:endParaRPr kumimoji="1" lang="zh-CN" altLang="en-US" dirty="0"/>
+          </a:p>
+        </p:txBody>
+      </p:sp>
+      <p:sp>
+        <p:nvSpPr>
+          <p:cNvPr id="8" name="矩形 7"/>
+          <p:cNvSpPr/>
+          <p:nvPr userDrawn="1"/>
+        </p:nvSpPr>
+        <p:spPr>
+          <a:xfrm>
+            <a:off x="6188242" y="4600066"/>
+            <a:ext cx="5472000" cy="724284"/>
+          </a:xfrm>
+          <a:prstGeom prst="rect">
+            <a:avLst/>
+          </a:prstGeom>
+          <a:solidFill>
+            <a:srgbClr val="ECFAFF">
+              <a:alpha val="9000"/>
+            </a:srgbClr>
+          </a:solidFill>
+          <a:ln>
+            <a:solidFill>
+              <a:srgbClr val="ECFAFF">
+                <a:alpha val="40000"/>
+              </a:srgbClr>
+            </a:solidFill>
+          </a:ln>
+        </p:spPr>
+        <p:style>
+          <a:lnRef idx="2">
+            <a:schemeClr val="accent1"/>
+          </a:lnRef>
+          <a:fillRef idx="1">
+            <a:schemeClr val="lt1"/>
+          </a:fillRef>
+          <a:effectRef idx="0">
+            <a:schemeClr val="accent1"/>
+          </a:effectRef>
+          <a:fontRef idx="minor">
+            <a:schemeClr val="dk1"/>
+          </a:fontRef>
+        </p:style>
+        <p:txBody>
+          <a:bodyPr rtlCol="0" anchor="ctr"/>
+          <a:lstStyle/>
+          <a:p>
+            <a:pPr algn="ctr"/>
+            <a:endParaRPr kumimoji="1" lang="zh-CN" altLang="en-US" dirty="0"/>
+          </a:p>
+        </p:txBody>
+      </p:sp>
+      <p:sp>
+        <p:nvSpPr>
+          <p:cNvPr id="9" name="矩形 8"/>
+          <p:cNvSpPr/>
+          <p:nvPr userDrawn="1"/>
+        </p:nvSpPr>
+        <p:spPr>
+          <a:xfrm>
+            <a:off x="531758" y="3643150"/>
+            <a:ext cx="5472000" cy="724284"/>
+          </a:xfrm>
+          <a:prstGeom prst="rect">
+            <a:avLst/>
+          </a:prstGeom>
+          <a:solidFill>
+            <a:srgbClr val="ECFAFF">
+              <a:alpha val="9000"/>
+            </a:srgbClr>
+          </a:solidFill>
+          <a:ln>
+            <a:solidFill>
+              <a:srgbClr val="ECFAFF">
+                <a:alpha val="40000"/>
+              </a:srgbClr>
+            </a:solidFill>
+          </a:ln>
+        </p:spPr>
+        <p:style>
+          <a:lnRef idx="2">
+            <a:schemeClr val="accent1"/>
+          </a:lnRef>
+          <a:fillRef idx="1">
+            <a:schemeClr val="lt1"/>
+          </a:fillRef>
+          <a:effectRef idx="0">
+            <a:schemeClr val="accent1"/>
+          </a:effectRef>
+          <a:fontRef idx="minor">
+            <a:schemeClr val="dk1"/>
+          </a:fontRef>
+        </p:style>
+        <p:txBody>
+          <a:bodyPr rtlCol="0" anchor="ctr"/>
+          <a:lstStyle/>
+          <a:p>
+            <a:pPr algn="ctr"/>
+            <a:endParaRPr kumimoji="1" lang="zh-CN" altLang="en-US" dirty="0"/>
+          </a:p>
+        </p:txBody>
+      </p:sp>
+      <p:sp>
+        <p:nvSpPr>
+          <p:cNvPr id="10" name="矩形 9"/>
+          <p:cNvSpPr/>
+          <p:nvPr userDrawn="1"/>
+        </p:nvSpPr>
+        <p:spPr>
+          <a:xfrm>
+            <a:off x="6188242" y="3643150"/>
+            <a:ext cx="5472000" cy="724284"/>
+          </a:xfrm>
+          <a:prstGeom prst="rect">
+            <a:avLst/>
+          </a:prstGeom>
+          <a:solidFill>
+            <a:srgbClr val="ECFAFF">
+              <a:alpha val="9000"/>
+            </a:srgbClr>
+          </a:solidFill>
+          <a:ln>
+            <a:solidFill>
+              <a:srgbClr val="ECFAFF">
+                <a:alpha val="40000"/>
+              </a:srgbClr>
+            </a:solidFill>
+          </a:ln>
+        </p:spPr>
+        <p:style>
+          <a:lnRef idx="2">
+            <a:schemeClr val="accent1"/>
+          </a:lnRef>
+          <a:fillRef idx="1">
+            <a:schemeClr val="lt1"/>
+          </a:fillRef>
+          <a:effectRef idx="0">
+            <a:schemeClr val="accent1"/>
+          </a:effectRef>
+          <a:fontRef idx="minor">
+            <a:schemeClr val="dk1"/>
+          </a:fontRef>
+        </p:style>
+        <p:txBody>
+          <a:bodyPr rtlCol="0" anchor="ctr"/>
+          <a:lstStyle/>
+          <a:p>
+            <a:pPr algn="ctr"/>
+            <a:endParaRPr kumimoji="1" lang="zh-CN" altLang="en-US" dirty="0"/>
+          </a:p>
+        </p:txBody>
+      </p:sp>
+      <p:sp>
+        <p:nvSpPr>
+          <p:cNvPr id="11" name="文本框 6">
+            <a:extLst>
+              <a:ext uri="{FF2B5EF4-FFF2-40B4-BE49-F238E27FC236}">
+                <a16:creationId xmlns:a16="http://schemas.microsoft.com/office/drawing/2014/main" xmlns="" id="{5D38C703-0535-2649-B4A0-B8F05CF7B2C5}"/>
+              </a:ext>
+            </a:extLst>
+          </p:cNvPr>
+          <p:cNvSpPr txBox="1"/>
+          <p:nvPr userDrawn="1"/>
+        </p:nvSpPr>
+        <p:spPr>
+          <a:xfrm>
+            <a:off x="1971758" y="3805237"/>
+            <a:ext cx="548810" cy="400110"/>
+          </a:xfrm>
+          <a:prstGeom prst="rect">
+            <a:avLst/>
+          </a:prstGeom>
+          <a:noFill/>
+        </p:spPr>
+        <p:txBody>
+          <a:bodyPr wrap="square" rtlCol="0" anchor="ctr" anchorCtr="0">
+            <a:spAutoFit/>
+          </a:bodyPr>
+          <a:lstStyle/>
+          <a:p>
+            <a:r>
+              <a:rPr kumimoji="1" lang="en-US" altLang="zh-CN" sz="2000" b="0" i="0" dirty="0">
+                <a:solidFill>
+                  <a:srgbClr val="ECFAFF"/>
+                </a:solidFill>
+                <a:latin typeface="PingFang SC" charset="-122"/>
+                <a:ea typeface="PingFang SC" charset="-122"/>
+                <a:cs typeface="PingFang SC" charset="-122"/>
+              </a:rPr>
+              <a:t>A.</a:t>
+            </a:r>
+            <a:endParaRPr kumimoji="1" lang="zh-CN" altLang="en-US" sz="2000" b="0" i="0" dirty="0">
+              <a:solidFill>
+                <a:srgbClr val="ECFAFF"/>
+              </a:solidFill>
+              <a:latin typeface="PingFang SC" charset="-122"/>
+              <a:ea typeface="PingFang SC" charset="-122"/>
+              <a:cs typeface="PingFang SC" charset="-122"/>
+            </a:endParaRPr>
+          </a:p>
+        </p:txBody>
+      </p:sp>
+      <p:sp>
+        <p:nvSpPr>
+          <p:cNvPr id="12" name="文本框 11">
+            <a:extLst>
+              <a:ext uri="{FF2B5EF4-FFF2-40B4-BE49-F238E27FC236}">
+                <a16:creationId xmlns:a16="http://schemas.microsoft.com/office/drawing/2014/main" xmlns="" id="{65E5CD98-D6C1-1848-86A2-A50598B55139}"/>
+              </a:ext>
+            </a:extLst>
+          </p:cNvPr>
+          <p:cNvSpPr txBox="1"/>
+          <p:nvPr userDrawn="1"/>
+        </p:nvSpPr>
+        <p:spPr>
+          <a:xfrm>
+            <a:off x="1971758" y="4762153"/>
+            <a:ext cx="548810" cy="400110"/>
+          </a:xfrm>
+          <a:prstGeom prst="rect">
+            <a:avLst/>
+          </a:prstGeom>
+          <a:noFill/>
+        </p:spPr>
+        <p:txBody>
+          <a:bodyPr wrap="square" rtlCol="0" anchor="ctr" anchorCtr="0">
+            <a:spAutoFit/>
+          </a:bodyPr>
+          <a:lstStyle/>
+          <a:p>
+            <a:r>
+              <a:rPr kumimoji="1" lang="en-US" altLang="zh-CN" sz="2000" b="0" i="0" dirty="0">
+                <a:solidFill>
+                  <a:srgbClr val="ECFAFF"/>
+                </a:solidFill>
+                <a:latin typeface="PingFang SC" charset="-122"/>
+                <a:ea typeface="PingFang SC" charset="-122"/>
+                <a:cs typeface="PingFang SC" charset="-122"/>
+              </a:rPr>
+              <a:t>C.</a:t>
+            </a:r>
+            <a:endParaRPr kumimoji="1" lang="zh-CN" altLang="en-US" sz="2000" b="0" i="0" dirty="0">
+              <a:solidFill>
+                <a:srgbClr val="ECFAFF"/>
+              </a:solidFill>
+              <a:latin typeface="PingFang SC" charset="-122"/>
+              <a:ea typeface="PingFang SC" charset="-122"/>
+              <a:cs typeface="PingFang SC" charset="-122"/>
+            </a:endParaRPr>
+          </a:p>
+        </p:txBody>
+      </p:sp>
+      <p:sp>
+        <p:nvSpPr>
+          <p:cNvPr id="13" name="文本框 6">
+            <a:extLst>
+              <a:ext uri="{FF2B5EF4-FFF2-40B4-BE49-F238E27FC236}">
+                <a16:creationId xmlns:a16="http://schemas.microsoft.com/office/drawing/2014/main" xmlns="" id="{5F9E940D-7090-E94B-8B49-5CA1D127071A}"/>
+              </a:ext>
+            </a:extLst>
+          </p:cNvPr>
+          <p:cNvSpPr txBox="1"/>
+          <p:nvPr userDrawn="1"/>
+        </p:nvSpPr>
+        <p:spPr>
+          <a:xfrm>
+            <a:off x="7614129" y="3805237"/>
+            <a:ext cx="548810" cy="400110"/>
+          </a:xfrm>
+          <a:prstGeom prst="rect">
+            <a:avLst/>
+          </a:prstGeom>
+          <a:noFill/>
+        </p:spPr>
+        <p:txBody>
+          <a:bodyPr wrap="square" rtlCol="0" anchor="ctr" anchorCtr="0">
+            <a:spAutoFit/>
+          </a:bodyPr>
+          <a:lstStyle/>
+          <a:p>
+            <a:r>
+              <a:rPr kumimoji="1" lang="en-US" altLang="zh-CN" sz="2000" b="0" i="0" dirty="0">
+                <a:solidFill>
+                  <a:srgbClr val="ECFAFF"/>
+                </a:solidFill>
+                <a:latin typeface="PingFang SC" charset="-122"/>
+                <a:ea typeface="PingFang SC" charset="-122"/>
+                <a:cs typeface="PingFang SC" charset="-122"/>
+              </a:rPr>
+              <a:t>B.</a:t>
+            </a:r>
+            <a:endParaRPr kumimoji="1" lang="zh-CN" altLang="en-US" sz="2000" b="0" i="0" dirty="0">
+              <a:solidFill>
+                <a:srgbClr val="ECFAFF"/>
+              </a:solidFill>
+              <a:latin typeface="PingFang SC" charset="-122"/>
+              <a:ea typeface="PingFang SC" charset="-122"/>
+              <a:cs typeface="PingFang SC" charset="-122"/>
+            </a:endParaRPr>
+          </a:p>
+        </p:txBody>
+      </p:sp>
+      <p:sp>
+        <p:nvSpPr>
+          <p:cNvPr id="14" name="文本框 6">
+            <a:extLst>
+              <a:ext uri="{FF2B5EF4-FFF2-40B4-BE49-F238E27FC236}">
+                <a16:creationId xmlns:a16="http://schemas.microsoft.com/office/drawing/2014/main" xmlns="" id="{BB9196A1-74E2-5046-99D0-EB0B468753EC}"/>
+              </a:ext>
+            </a:extLst>
+          </p:cNvPr>
+          <p:cNvSpPr txBox="1"/>
+          <p:nvPr userDrawn="1"/>
+        </p:nvSpPr>
+        <p:spPr>
+          <a:xfrm>
+            <a:off x="7614129" y="4762153"/>
+            <a:ext cx="548810" cy="400110"/>
+          </a:xfrm>
+          <a:prstGeom prst="rect">
+            <a:avLst/>
+          </a:prstGeom>
+          <a:noFill/>
+        </p:spPr>
+        <p:txBody>
+          <a:bodyPr wrap="square" rtlCol="0" anchor="ctr" anchorCtr="0">
+            <a:spAutoFit/>
+          </a:bodyPr>
+          <a:lstStyle/>
+          <a:p>
+            <a:r>
+              <a:rPr kumimoji="1" lang="en-US" altLang="zh-CN" sz="2000" b="0" i="0" dirty="0">
+                <a:solidFill>
+                  <a:srgbClr val="ECFAFF"/>
+                </a:solidFill>
+                <a:latin typeface="PingFang SC" charset="-122"/>
+                <a:ea typeface="PingFang SC" charset="-122"/>
+                <a:cs typeface="PingFang SC" charset="-122"/>
+              </a:rPr>
+              <a:t>D.</a:t>
+            </a:r>
+            <a:endParaRPr kumimoji="1" lang="zh-CN" altLang="en-US" sz="2000" b="0" i="0" dirty="0">
+              <a:solidFill>
+                <a:srgbClr val="ECFAFF"/>
+              </a:solidFill>
+              <a:latin typeface="PingFang SC" charset="-122"/>
+              <a:ea typeface="PingFang SC" charset="-122"/>
+              <a:cs typeface="PingFang SC" charset="-122"/>
+            </a:endParaRPr>
+          </a:p>
+        </p:txBody>
+      </p:sp>
+      <p:sp>
+        <p:nvSpPr>
+          <p:cNvPr id="15" name="文本占位符 20"/>
+          <p:cNvSpPr>
+            <a:spLocks noGrp="1"/>
+          </p:cNvSpPr>
+          <p:nvPr>
+            <p:ph type="body" sz="quarter" idx="14" hasCustomPrompt="1"/>
+          </p:nvPr>
+        </p:nvSpPr>
+        <p:spPr>
+          <a:xfrm>
+            <a:off x="2394274" y="3820626"/>
+            <a:ext cx="3452388" cy="369332"/>
+          </a:xfrm>
+          <a:prstGeom prst="rect">
+            <a:avLst/>
+          </a:prstGeom>
+        </p:spPr>
+        <p:txBody>
+          <a:bodyPr wrap="square" anchor="ctr" anchorCtr="0">
+            <a:noAutofit/>
+          </a:bodyPr>
+          <a:lstStyle>
+            <a:lvl1pPr marL="0" indent="0" algn="l">
+              <a:buFontTx/>
+              <a:buNone/>
+              <a:defRPr sz="2000" baseline="0">
+                <a:solidFill>
+                  <a:srgbClr val="ECFAFF"/>
+                </a:solidFill>
+                <a:latin typeface="PingFang SC" charset="-122"/>
+                <a:ea typeface="PingFang SC" charset="-122"/>
+                <a:cs typeface="PingFang SC" charset="-122"/>
+              </a:defRPr>
+            </a:lvl1pPr>
+            <a:lvl2pPr marL="457200" indent="0" algn="l">
+              <a:buFontTx/>
+              <a:buNone/>
+              <a:defRPr sz="2000">
+                <a:solidFill>
+                  <a:srgbClr val="ECFAFF"/>
+                </a:solidFill>
+                <a:latin typeface="PingFang SC" charset="-122"/>
+                <a:ea typeface="PingFang SC" charset="-122"/>
+                <a:cs typeface="PingFang SC" charset="-122"/>
+              </a:defRPr>
+            </a:lvl2pPr>
+            <a:lvl3pPr marL="914400" indent="0" algn="l">
+              <a:buFontTx/>
+              <a:buNone/>
+              <a:defRPr sz="2000">
+                <a:solidFill>
+                  <a:srgbClr val="ECFAFF"/>
+                </a:solidFill>
+                <a:latin typeface="PingFang SC" charset="-122"/>
+                <a:ea typeface="PingFang SC" charset="-122"/>
+                <a:cs typeface="PingFang SC" charset="-122"/>
+              </a:defRPr>
+            </a:lvl3pPr>
+            <a:lvl4pPr marL="1371600" indent="0" algn="l">
+              <a:buFontTx/>
+              <a:buNone/>
+              <a:defRPr sz="2000">
+                <a:solidFill>
+                  <a:srgbClr val="ECFAFF"/>
+                </a:solidFill>
+                <a:latin typeface="PingFang SC" charset="-122"/>
+                <a:ea typeface="PingFang SC" charset="-122"/>
+                <a:cs typeface="PingFang SC" charset="-122"/>
+              </a:defRPr>
+            </a:lvl4pPr>
+            <a:lvl5pPr marL="1828800" indent="0" algn="l">
+              <a:buFontTx/>
+              <a:buNone/>
+              <a:defRPr sz="2000">
+                <a:solidFill>
+                  <a:srgbClr val="ECFAFF"/>
+                </a:solidFill>
+                <a:latin typeface="PingFang SC" charset="-122"/>
+                <a:ea typeface="PingFang SC" charset="-122"/>
+                <a:cs typeface="PingFang SC" charset="-122"/>
+              </a:defRPr>
+            </a:lvl5pPr>
+          </a:lstStyle>
+          <a:p>
+            <a:pPr lvl="0"/>
+            <a:r>
+              <a:rPr kumimoji="1" lang="en-US" altLang="zh-CN" dirty="0" smtClean="0"/>
+              <a:t>Choice</a:t>
+            </a:r>
+            <a:r>
+              <a:rPr kumimoji="1" lang="zh-CN" altLang="en-US" dirty="0" smtClean="0"/>
+              <a:t> </a:t>
+            </a:r>
+            <a:r>
+              <a:rPr kumimoji="1" lang="en-US" altLang="zh-CN" dirty="0" smtClean="0"/>
+              <a:t>A</a:t>
+            </a:r>
+            <a:r>
+              <a:rPr kumimoji="1" lang="zh-CN" altLang="en-US" dirty="0" smtClean="0"/>
+              <a:t> </a:t>
+            </a:r>
+            <a:r>
+              <a:rPr kumimoji="1" lang="en-US" altLang="zh-CN" dirty="0" smtClean="0"/>
+              <a:t>+</a:t>
+            </a:r>
+            <a:r>
+              <a:rPr kumimoji="1" lang="zh-CN" altLang="en-US" dirty="0" smtClean="0"/>
+              <a:t> 释义</a:t>
+            </a:r>
+            <a:endParaRPr kumimoji="1" lang="zh-CN" altLang="en-US" dirty="0"/>
+          </a:p>
+        </p:txBody>
+      </p:sp>
+      <p:sp>
+        <p:nvSpPr>
+          <p:cNvPr id="16" name="文本占位符 20"/>
+          <p:cNvSpPr>
+            <a:spLocks noGrp="1"/>
+          </p:cNvSpPr>
+          <p:nvPr>
+            <p:ph type="body" sz="quarter" idx="15" hasCustomPrompt="1"/>
+          </p:nvPr>
+        </p:nvSpPr>
+        <p:spPr>
+          <a:xfrm>
+            <a:off x="8050858" y="3820626"/>
+            <a:ext cx="3458939" cy="369332"/>
+          </a:xfrm>
+          <a:prstGeom prst="rect">
+            <a:avLst/>
+          </a:prstGeom>
+        </p:spPr>
+        <p:txBody>
+          <a:bodyPr wrap="square" anchor="ctr" anchorCtr="0">
+            <a:noAutofit/>
+          </a:bodyPr>
+          <a:lstStyle>
+            <a:lvl1pPr marL="0" marR="0" indent="0" algn="l" defTabSz="914400" rtl="0" eaLnBrk="1" fontAlgn="auto" latinLnBrk="0" hangingPunct="1">
+              <a:lnSpc>
+                <a:spcPct val="90000"/>
+              </a:lnSpc>
+              <a:spcBef>
+                <a:spcPts val="1000"/>
+              </a:spcBef>
+              <a:spcAft>
+                <a:spcPts val="0"/>
+              </a:spcAft>
+              <a:buClrTx/>
+              <a:buSzTx/>
+              <a:buFontTx/>
+              <a:buNone/>
+              <a:tabLst/>
+              <a:defRPr sz="2000" baseline="0">
+                <a:solidFill>
+                  <a:srgbClr val="ECFAFF"/>
+                </a:solidFill>
+                <a:latin typeface="PingFang SC" charset="-122"/>
+                <a:ea typeface="PingFang SC" charset="-122"/>
+                <a:cs typeface="PingFang SC" charset="-122"/>
+              </a:defRPr>
+            </a:lvl1pPr>
+            <a:lvl2pPr marL="457200" indent="0" algn="l">
+              <a:buFontTx/>
+              <a:buNone/>
+              <a:defRPr sz="2000">
+                <a:solidFill>
+                  <a:srgbClr val="ECFAFF"/>
+                </a:solidFill>
+                <a:latin typeface="PingFang SC" charset="-122"/>
+                <a:ea typeface="PingFang SC" charset="-122"/>
+                <a:cs typeface="PingFang SC" charset="-122"/>
+              </a:defRPr>
+            </a:lvl2pPr>
+            <a:lvl3pPr marL="914400" indent="0" algn="l">
+              <a:buFontTx/>
+              <a:buNone/>
+              <a:defRPr sz="2000">
+                <a:solidFill>
+                  <a:srgbClr val="ECFAFF"/>
+                </a:solidFill>
+                <a:latin typeface="PingFang SC" charset="-122"/>
+                <a:ea typeface="PingFang SC" charset="-122"/>
+                <a:cs typeface="PingFang SC" charset="-122"/>
+              </a:defRPr>
+            </a:lvl3pPr>
+            <a:lvl4pPr marL="1371600" indent="0" algn="l">
+              <a:buFontTx/>
+              <a:buNone/>
+              <a:defRPr sz="2000">
+                <a:solidFill>
+                  <a:srgbClr val="ECFAFF"/>
+                </a:solidFill>
+                <a:latin typeface="PingFang SC" charset="-122"/>
+                <a:ea typeface="PingFang SC" charset="-122"/>
+                <a:cs typeface="PingFang SC" charset="-122"/>
+              </a:defRPr>
+            </a:lvl4pPr>
+            <a:lvl5pPr marL="1828800" indent="0" algn="l">
+              <a:buFontTx/>
+              <a:buNone/>
+              <a:defRPr sz="2000">
+                <a:solidFill>
+                  <a:srgbClr val="ECFAFF"/>
+                </a:solidFill>
+                <a:latin typeface="PingFang SC" charset="-122"/>
+                <a:ea typeface="PingFang SC" charset="-122"/>
+                <a:cs typeface="PingFang SC" charset="-122"/>
+              </a:defRPr>
+            </a:lvl5pPr>
+          </a:lstStyle>
+          <a:p>
+            <a:pPr marL="0" marR="0" lvl="0" indent="0" algn="l" defTabSz="914400" rtl="0" eaLnBrk="1" fontAlgn="auto" latinLnBrk="0" hangingPunct="1">
+              <a:lnSpc>
+                <a:spcPct val="90000"/>
+              </a:lnSpc>
+              <a:spcBef>
+                <a:spcPts val="1000"/>
+              </a:spcBef>
+              <a:spcAft>
+                <a:spcPts val="0"/>
+              </a:spcAft>
+              <a:buClrTx/>
+              <a:buSzTx/>
+              <a:buFontTx/>
+              <a:buNone/>
+              <a:tabLst/>
+              <a:defRPr/>
+            </a:pPr>
+            <a:r>
+              <a:rPr kumimoji="1" lang="en-US" altLang="zh-CN" dirty="0" smtClean="0"/>
+              <a:t>Choice</a:t>
+            </a:r>
+            <a:r>
+              <a:rPr kumimoji="1" lang="zh-CN" altLang="en-US" dirty="0" smtClean="0"/>
+              <a:t> </a:t>
+            </a:r>
+            <a:r>
+              <a:rPr kumimoji="1" lang="en-US" altLang="zh-CN" dirty="0" smtClean="0"/>
+              <a:t>B</a:t>
+            </a:r>
+            <a:r>
+              <a:rPr kumimoji="1" lang="zh-CN" altLang="en-US" dirty="0" smtClean="0"/>
+              <a:t> </a:t>
+            </a:r>
+            <a:r>
+              <a:rPr kumimoji="1" lang="en-US" altLang="zh-CN" dirty="0" smtClean="0"/>
+              <a:t>+</a:t>
+            </a:r>
+            <a:r>
+              <a:rPr kumimoji="1" lang="zh-CN" altLang="en-US" dirty="0" smtClean="0"/>
+              <a:t> 释义</a:t>
+            </a:r>
+          </a:p>
+        </p:txBody>
+      </p:sp>
+      <p:sp>
+        <p:nvSpPr>
+          <p:cNvPr id="17" name="文本占位符 20"/>
+          <p:cNvSpPr>
+            <a:spLocks noGrp="1"/>
+          </p:cNvSpPr>
+          <p:nvPr>
+            <p:ph type="body" sz="quarter" idx="16" hasCustomPrompt="1"/>
+          </p:nvPr>
+        </p:nvSpPr>
+        <p:spPr>
+          <a:xfrm>
+            <a:off x="2392353" y="4777542"/>
+            <a:ext cx="3500447" cy="369332"/>
+          </a:xfrm>
+          <a:prstGeom prst="rect">
+            <a:avLst/>
+          </a:prstGeom>
+        </p:spPr>
+        <p:txBody>
+          <a:bodyPr wrap="square" anchor="ctr" anchorCtr="0">
+            <a:noAutofit/>
+          </a:bodyPr>
+          <a:lstStyle>
+            <a:lvl1pPr marL="0" marR="0" indent="0" algn="l" defTabSz="914400" rtl="0" eaLnBrk="1" fontAlgn="auto" latinLnBrk="0" hangingPunct="1">
+              <a:lnSpc>
+                <a:spcPct val="90000"/>
+              </a:lnSpc>
+              <a:spcBef>
+                <a:spcPts val="1000"/>
+              </a:spcBef>
+              <a:spcAft>
+                <a:spcPts val="0"/>
+              </a:spcAft>
+              <a:buClrTx/>
+              <a:buSzTx/>
+              <a:buFontTx/>
+              <a:buNone/>
+              <a:tabLst/>
+              <a:defRPr sz="2000" baseline="0">
+                <a:solidFill>
+                  <a:srgbClr val="ECFAFF"/>
+                </a:solidFill>
+                <a:latin typeface="PingFang SC" charset="-122"/>
+                <a:ea typeface="PingFang SC" charset="-122"/>
+                <a:cs typeface="PingFang SC" charset="-122"/>
+              </a:defRPr>
+            </a:lvl1pPr>
+            <a:lvl2pPr marL="457200" indent="0" algn="l">
+              <a:buFontTx/>
+              <a:buNone/>
+              <a:defRPr sz="2000">
+                <a:solidFill>
+                  <a:srgbClr val="ECFAFF"/>
+                </a:solidFill>
+                <a:latin typeface="PingFang SC" charset="-122"/>
+                <a:ea typeface="PingFang SC" charset="-122"/>
+                <a:cs typeface="PingFang SC" charset="-122"/>
+              </a:defRPr>
+            </a:lvl2pPr>
+            <a:lvl3pPr marL="914400" indent="0" algn="l">
+              <a:buFontTx/>
+              <a:buNone/>
+              <a:defRPr sz="2000">
+                <a:solidFill>
+                  <a:srgbClr val="ECFAFF"/>
+                </a:solidFill>
+                <a:latin typeface="PingFang SC" charset="-122"/>
+                <a:ea typeface="PingFang SC" charset="-122"/>
+                <a:cs typeface="PingFang SC" charset="-122"/>
+              </a:defRPr>
+            </a:lvl3pPr>
+            <a:lvl4pPr marL="1371600" indent="0" algn="l">
+              <a:buFontTx/>
+              <a:buNone/>
+              <a:defRPr sz="2000">
+                <a:solidFill>
+                  <a:srgbClr val="ECFAFF"/>
+                </a:solidFill>
+                <a:latin typeface="PingFang SC" charset="-122"/>
+                <a:ea typeface="PingFang SC" charset="-122"/>
+                <a:cs typeface="PingFang SC" charset="-122"/>
+              </a:defRPr>
+            </a:lvl4pPr>
+            <a:lvl5pPr marL="1828800" indent="0" algn="l">
+              <a:buFontTx/>
+              <a:buNone/>
+              <a:defRPr sz="2000">
+                <a:solidFill>
+                  <a:srgbClr val="ECFAFF"/>
+                </a:solidFill>
+                <a:latin typeface="PingFang SC" charset="-122"/>
+                <a:ea typeface="PingFang SC" charset="-122"/>
+                <a:cs typeface="PingFang SC" charset="-122"/>
+              </a:defRPr>
+            </a:lvl5pPr>
+          </a:lstStyle>
+          <a:p>
+            <a:pPr marL="0" marR="0" lvl="0" indent="0" algn="l" defTabSz="914400" rtl="0" eaLnBrk="1" fontAlgn="auto" latinLnBrk="0" hangingPunct="1">
+              <a:lnSpc>
+                <a:spcPct val="90000"/>
+              </a:lnSpc>
+              <a:spcBef>
+                <a:spcPts val="1000"/>
+              </a:spcBef>
+              <a:spcAft>
+                <a:spcPts val="0"/>
+              </a:spcAft>
+              <a:buClrTx/>
+              <a:buSzTx/>
+              <a:buFontTx/>
+              <a:buNone/>
+              <a:tabLst/>
+              <a:defRPr/>
+            </a:pPr>
+            <a:r>
+              <a:rPr kumimoji="1" lang="en-US" altLang="zh-CN" dirty="0" smtClean="0"/>
+              <a:t>Choice</a:t>
+            </a:r>
+            <a:r>
+              <a:rPr kumimoji="1" lang="zh-CN" altLang="en-US" dirty="0" smtClean="0"/>
+              <a:t> </a:t>
+            </a:r>
+            <a:r>
+              <a:rPr kumimoji="1" lang="en-US" altLang="zh-CN" dirty="0" smtClean="0"/>
+              <a:t>C</a:t>
+            </a:r>
+            <a:r>
+              <a:rPr kumimoji="1" lang="zh-CN" altLang="en-US" dirty="0" smtClean="0"/>
+              <a:t> </a:t>
+            </a:r>
+            <a:r>
+              <a:rPr kumimoji="1" lang="en-US" altLang="zh-CN" dirty="0" smtClean="0"/>
+              <a:t>+</a:t>
+            </a:r>
+            <a:r>
+              <a:rPr kumimoji="1" lang="zh-CN" altLang="en-US" dirty="0" smtClean="0"/>
+              <a:t> 释义</a:t>
+            </a:r>
+          </a:p>
+        </p:txBody>
+      </p:sp>
+      <p:sp>
+        <p:nvSpPr>
+          <p:cNvPr id="18" name="文本占位符 20"/>
+          <p:cNvSpPr>
+            <a:spLocks noGrp="1"/>
+          </p:cNvSpPr>
+          <p:nvPr>
+            <p:ph type="body" sz="quarter" idx="17" hasCustomPrompt="1"/>
+          </p:nvPr>
+        </p:nvSpPr>
+        <p:spPr>
+          <a:xfrm>
+            <a:off x="8050859" y="4777542"/>
+            <a:ext cx="3480742" cy="369332"/>
+          </a:xfrm>
+          <a:prstGeom prst="rect">
+            <a:avLst/>
+          </a:prstGeom>
+        </p:spPr>
+        <p:txBody>
+          <a:bodyPr wrap="square" anchor="ctr" anchorCtr="0">
+            <a:noAutofit/>
+          </a:bodyPr>
+          <a:lstStyle>
+            <a:lvl1pPr marL="0" marR="0" indent="0" algn="l" defTabSz="914400" rtl="0" eaLnBrk="1" fontAlgn="auto" latinLnBrk="0" hangingPunct="1">
+              <a:lnSpc>
+                <a:spcPct val="90000"/>
+              </a:lnSpc>
+              <a:spcBef>
+                <a:spcPts val="1000"/>
+              </a:spcBef>
+              <a:spcAft>
+                <a:spcPts val="0"/>
+              </a:spcAft>
+              <a:buClrTx/>
+              <a:buSzTx/>
+              <a:buFontTx/>
+              <a:buNone/>
+              <a:tabLst/>
+              <a:defRPr sz="2000" baseline="0">
+                <a:solidFill>
+                  <a:srgbClr val="ECFAFF"/>
+                </a:solidFill>
+                <a:latin typeface="PingFang SC" charset="-122"/>
+                <a:ea typeface="PingFang SC" charset="-122"/>
+                <a:cs typeface="PingFang SC" charset="-122"/>
+              </a:defRPr>
+            </a:lvl1pPr>
+            <a:lvl2pPr marL="457200" indent="0" algn="l">
+              <a:buFontTx/>
+              <a:buNone/>
+              <a:defRPr sz="2000">
+                <a:solidFill>
+                  <a:srgbClr val="ECFAFF"/>
+                </a:solidFill>
+                <a:latin typeface="PingFang SC" charset="-122"/>
+                <a:ea typeface="PingFang SC" charset="-122"/>
+                <a:cs typeface="PingFang SC" charset="-122"/>
+              </a:defRPr>
+            </a:lvl2pPr>
+            <a:lvl3pPr marL="914400" indent="0" algn="l">
+              <a:buFontTx/>
+              <a:buNone/>
+              <a:defRPr sz="2000">
+                <a:solidFill>
+                  <a:srgbClr val="ECFAFF"/>
+                </a:solidFill>
+                <a:latin typeface="PingFang SC" charset="-122"/>
+                <a:ea typeface="PingFang SC" charset="-122"/>
+                <a:cs typeface="PingFang SC" charset="-122"/>
+              </a:defRPr>
+            </a:lvl3pPr>
+            <a:lvl4pPr marL="1371600" indent="0" algn="l">
+              <a:buFontTx/>
+              <a:buNone/>
+              <a:defRPr sz="2000">
+                <a:solidFill>
+                  <a:srgbClr val="ECFAFF"/>
+                </a:solidFill>
+                <a:latin typeface="PingFang SC" charset="-122"/>
+                <a:ea typeface="PingFang SC" charset="-122"/>
+                <a:cs typeface="PingFang SC" charset="-122"/>
+              </a:defRPr>
+            </a:lvl4pPr>
+            <a:lvl5pPr marL="1828800" indent="0" algn="l">
+              <a:buFontTx/>
+              <a:buNone/>
+              <a:defRPr sz="2000">
+                <a:solidFill>
+                  <a:srgbClr val="ECFAFF"/>
+                </a:solidFill>
+                <a:latin typeface="PingFang SC" charset="-122"/>
+                <a:ea typeface="PingFang SC" charset="-122"/>
+                <a:cs typeface="PingFang SC" charset="-122"/>
+              </a:defRPr>
+            </a:lvl5pPr>
+          </a:lstStyle>
+          <a:p>
+            <a:pPr marL="0" marR="0" lvl="0" indent="0" algn="l" defTabSz="914400" rtl="0" eaLnBrk="1" fontAlgn="auto" latinLnBrk="0" hangingPunct="1">
+              <a:lnSpc>
+                <a:spcPct val="90000"/>
+              </a:lnSpc>
+              <a:spcBef>
+                <a:spcPts val="1000"/>
+              </a:spcBef>
+              <a:spcAft>
+                <a:spcPts val="0"/>
+              </a:spcAft>
+              <a:buClrTx/>
+              <a:buSzTx/>
+              <a:buFontTx/>
+              <a:buNone/>
+              <a:tabLst/>
+              <a:defRPr/>
+            </a:pPr>
+            <a:r>
+              <a:rPr kumimoji="1" lang="en-US" altLang="zh-CN" dirty="0" smtClean="0"/>
+              <a:t>Choice</a:t>
+            </a:r>
+            <a:r>
+              <a:rPr kumimoji="1" lang="zh-CN" altLang="en-US" dirty="0" smtClean="0"/>
+              <a:t> </a:t>
+            </a:r>
+            <a:r>
+              <a:rPr kumimoji="1" lang="en-US" altLang="zh-CN" dirty="0" smtClean="0"/>
+              <a:t>D</a:t>
+            </a:r>
+            <a:r>
+              <a:rPr kumimoji="1" lang="zh-CN" altLang="en-US" dirty="0" smtClean="0"/>
+              <a:t> </a:t>
+            </a:r>
+            <a:r>
+              <a:rPr kumimoji="1" lang="en-US" altLang="zh-CN" dirty="0" smtClean="0"/>
+              <a:t>+</a:t>
+            </a:r>
+            <a:r>
+              <a:rPr kumimoji="1" lang="zh-CN" altLang="en-US" dirty="0" smtClean="0"/>
+              <a:t> 释义</a:t>
+            </a:r>
+          </a:p>
+        </p:txBody>
+      </p:sp>
+      <p:sp>
+        <p:nvSpPr>
+          <p:cNvPr id="23" name="文本占位符 22"/>
+          <p:cNvSpPr>
+            <a:spLocks noGrp="1"/>
+          </p:cNvSpPr>
+          <p:nvPr>
+            <p:ph type="body" sz="quarter" idx="18" hasCustomPrompt="1"/>
+          </p:nvPr>
+        </p:nvSpPr>
+        <p:spPr>
+          <a:xfrm>
+            <a:off x="531813" y="5513398"/>
+            <a:ext cx="11128375" cy="989001"/>
+          </a:xfrm>
+          <a:prstGeom prst="rect">
+            <a:avLst/>
+          </a:prstGeom>
+        </p:spPr>
+        <p:txBody>
+          <a:bodyPr anchor="ctr"/>
+          <a:lstStyle>
+            <a:lvl1pPr marL="0" indent="0" algn="ctr">
+              <a:lnSpc>
+                <a:spcPct val="100000"/>
+              </a:lnSpc>
+              <a:buFontTx/>
+              <a:buNone/>
+              <a:defRPr sz="2000">
+                <a:solidFill>
+                  <a:srgbClr val="ECFAFF"/>
+                </a:solidFill>
+                <a:latin typeface="PingFang SC" charset="-122"/>
+                <a:ea typeface="PingFang SC" charset="-122"/>
+                <a:cs typeface="PingFang SC" charset="-122"/>
+              </a:defRPr>
+            </a:lvl1pPr>
+            <a:lvl2pPr marL="457200" indent="0" algn="ctr">
+              <a:buFontTx/>
+              <a:buNone/>
+              <a:defRPr sz="2000">
+                <a:solidFill>
+                  <a:srgbClr val="ECFAFF"/>
+                </a:solidFill>
+                <a:latin typeface="PingFang SC" charset="-122"/>
+                <a:ea typeface="PingFang SC" charset="-122"/>
+                <a:cs typeface="PingFang SC" charset="-122"/>
+              </a:defRPr>
+            </a:lvl2pPr>
+            <a:lvl3pPr marL="914400" indent="0" algn="ctr">
+              <a:buFontTx/>
+              <a:buNone/>
+              <a:defRPr sz="2000">
+                <a:solidFill>
+                  <a:srgbClr val="ECFAFF"/>
+                </a:solidFill>
+                <a:latin typeface="PingFang SC" charset="-122"/>
+                <a:ea typeface="PingFang SC" charset="-122"/>
+                <a:cs typeface="PingFang SC" charset="-122"/>
+              </a:defRPr>
+            </a:lvl3pPr>
+            <a:lvl4pPr marL="1371600" indent="0" algn="ctr">
+              <a:buFontTx/>
+              <a:buNone/>
+              <a:defRPr sz="2000">
+                <a:solidFill>
+                  <a:srgbClr val="ECFAFF"/>
+                </a:solidFill>
+                <a:latin typeface="PingFang SC" charset="-122"/>
+                <a:ea typeface="PingFang SC" charset="-122"/>
+                <a:cs typeface="PingFang SC" charset="-122"/>
+              </a:defRPr>
+            </a:lvl4pPr>
+            <a:lvl5pPr marL="1828800" indent="0" algn="ctr">
+              <a:buFontTx/>
+              <a:buNone/>
+              <a:defRPr sz="2000">
+                <a:solidFill>
+                  <a:srgbClr val="ECFAFF"/>
+                </a:solidFill>
+                <a:latin typeface="PingFang SC" charset="-122"/>
+                <a:ea typeface="PingFang SC" charset="-122"/>
+                <a:cs typeface="PingFang SC" charset="-122"/>
+              </a:defRPr>
+            </a:lvl5pPr>
+          </a:lstStyle>
+          <a:p>
+            <a:pPr lvl="0"/>
+            <a:r>
+              <a:rPr kumimoji="1" lang="zh-CN" altLang="en-US" dirty="0" smtClean="0"/>
+              <a:t>更多解释</a:t>
+            </a:r>
+            <a:r>
+              <a:rPr kumimoji="1" lang="en-US" altLang="zh-CN" dirty="0" smtClean="0"/>
+              <a:t>/</a:t>
+            </a:r>
+            <a:r>
+              <a:rPr kumimoji="1" lang="zh-CN" altLang="en-US" dirty="0" smtClean="0"/>
+              <a:t>备注：这里是文字</a:t>
+            </a:r>
+            <a:endParaRPr kumimoji="1" lang="zh-CN" altLang="en-US" dirty="0"/>
+          </a:p>
+        </p:txBody>
+      </p:sp>
+      <p:sp>
+        <p:nvSpPr>
+          <p:cNvPr id="2" name="文本框 1"/>
+          <p:cNvSpPr txBox="1"/>
+          <p:nvPr userDrawn="1"/>
+        </p:nvSpPr>
+        <p:spPr>
+          <a:xfrm>
+            <a:off x="5145969" y="739858"/>
+            <a:ext cx="1798841" cy="400110"/>
+          </a:xfrm>
+          <a:prstGeom prst="rect">
+            <a:avLst/>
+          </a:prstGeom>
+          <a:noFill/>
+        </p:spPr>
+        <p:txBody>
+          <a:bodyPr wrap="square" rtlCol="0" anchor="ctr">
+            <a:spAutoFit/>
+          </a:bodyPr>
+          <a:lstStyle/>
+          <a:p>
+            <a:pPr marL="0" marR="0" indent="0" algn="l" defTabSz="914400" rtl="0" eaLnBrk="1" fontAlgn="auto" latinLnBrk="0" hangingPunct="1">
+              <a:lnSpc>
+                <a:spcPct val="100000"/>
+              </a:lnSpc>
+              <a:spcBef>
+                <a:spcPts val="0"/>
+              </a:spcBef>
+              <a:spcAft>
+                <a:spcPts val="0"/>
+              </a:spcAft>
+              <a:buClrTx/>
+              <a:buSzTx/>
+              <a:buFontTx/>
+              <a:buNone/>
+              <a:tabLst/>
+              <a:defRPr/>
+            </a:pPr>
+            <a:r>
+              <a:rPr kumimoji="1" lang="zh-CN" altLang="en-US" sz="2000" b="0" i="0" u="none" strike="noStrike" kern="1200" cap="none" spc="0" normalizeH="0" baseline="0" noProof="0" dirty="0" smtClean="0">
+                <a:ln>
+                  <a:noFill/>
+                </a:ln>
+                <a:solidFill>
+                  <a:srgbClr val="ECFAFF"/>
+                </a:solidFill>
+                <a:effectLst/>
+                <a:uLnTx/>
+                <a:uFillTx/>
+                <a:latin typeface="PingFang SC" charset="-122"/>
+                <a:ea typeface="PingFang SC" charset="-122"/>
+                <a:cs typeface="PingFang SC" charset="-122"/>
+              </a:rPr>
+              <a:t>正确解答：</a:t>
+            </a:r>
+            <a:endParaRPr kumimoji="1" lang="zh-CN" altLang="en-US" sz="2000" dirty="0">
+              <a:solidFill>
+                <a:srgbClr val="ECFAFF"/>
+              </a:solidFill>
+              <a:latin typeface="PingFang SC" charset="-122"/>
+              <a:ea typeface="PingFang SC" charset="-122"/>
+              <a:cs typeface="PingFang SC" charset="-122"/>
+            </a:endParaRPr>
+          </a:p>
+        </p:txBody>
+      </p:sp>
+    </p:spTree>
+    <p:extLst>
+      <p:ext uri="{BB962C8B-B14F-4D97-AF65-F5344CB8AC3E}">
+        <p14:creationId xmlns:p14="http://schemas.microsoft.com/office/powerpoint/2010/main" val="2095891715"/>
       </p:ext>
     </p:extLst>
   </p:cSld>
@@ -3058,7 +5909,7 @@
           <p:cNvPr id="8" name="文本占位符 3">
             <a:extLst>
               <a:ext uri="{FF2B5EF4-FFF2-40B4-BE49-F238E27FC236}">
-                <a16:creationId xmlns:a16="http://schemas.microsoft.com/office/drawing/2014/main" xmlns="" id="{5BA5F626-1F8E-054A-918D-94622AD4EABF}"/>
+                <a16:creationId xmlns="" xmlns:a16="http://schemas.microsoft.com/office/drawing/2014/main" id="{5BA5F626-1F8E-054A-918D-94622AD4EABF}"/>
               </a:ext>
             </a:extLst>
           </p:cNvPr>
@@ -3147,7 +5998,7 @@
           <p:cNvPr id="9" name="文本占位符 3">
             <a:extLst>
               <a:ext uri="{FF2B5EF4-FFF2-40B4-BE49-F238E27FC236}">
-                <a16:creationId xmlns:a16="http://schemas.microsoft.com/office/drawing/2014/main" xmlns="" id="{5FCCDF54-3207-5346-9F95-0AC916F61892}"/>
+                <a16:creationId xmlns="" xmlns:a16="http://schemas.microsoft.com/office/drawing/2014/main" id="{5FCCDF54-3207-5346-9F95-0AC916F61892}"/>
               </a:ext>
             </a:extLst>
           </p:cNvPr>
@@ -3236,7 +6087,7 @@
           <p:cNvPr id="10" name="文本占位符 3">
             <a:extLst>
               <a:ext uri="{FF2B5EF4-FFF2-40B4-BE49-F238E27FC236}">
-                <a16:creationId xmlns:a16="http://schemas.microsoft.com/office/drawing/2014/main" xmlns="" id="{B191C670-839A-7542-ADC9-27051AC8F6B2}"/>
+                <a16:creationId xmlns="" xmlns:a16="http://schemas.microsoft.com/office/drawing/2014/main" id="{B191C670-839A-7542-ADC9-27051AC8F6B2}"/>
               </a:ext>
             </a:extLst>
           </p:cNvPr>
@@ -3325,7 +6176,7 @@
           <p:cNvPr id="11" name="文本框 6">
             <a:extLst>
               <a:ext uri="{FF2B5EF4-FFF2-40B4-BE49-F238E27FC236}">
-                <a16:creationId xmlns:a16="http://schemas.microsoft.com/office/drawing/2014/main" xmlns="" id="{CFFCA465-7096-CF48-82C4-BBF12BAED15D}"/>
+                <a16:creationId xmlns="" xmlns:a16="http://schemas.microsoft.com/office/drawing/2014/main" id="{CFFCA465-7096-CF48-82C4-BBF12BAED15D}"/>
               </a:ext>
             </a:extLst>
           </p:cNvPr>
@@ -3375,7 +6226,7 @@
           <p:cNvPr id="12" name="文本框 6">
             <a:extLst>
               <a:ext uri="{FF2B5EF4-FFF2-40B4-BE49-F238E27FC236}">
-                <a16:creationId xmlns:a16="http://schemas.microsoft.com/office/drawing/2014/main" xmlns="" id="{58BB7382-28F7-B140-99CA-079FE427AFED}"/>
+                <a16:creationId xmlns="" xmlns:a16="http://schemas.microsoft.com/office/drawing/2014/main" id="{58BB7382-28F7-B140-99CA-079FE427AFED}"/>
               </a:ext>
             </a:extLst>
           </p:cNvPr>
@@ -3425,7 +6276,7 @@
           <p:cNvPr id="13" name="文本框 6">
             <a:extLst>
               <a:ext uri="{FF2B5EF4-FFF2-40B4-BE49-F238E27FC236}">
-                <a16:creationId xmlns:a16="http://schemas.microsoft.com/office/drawing/2014/main" xmlns="" id="{6857E332-9933-9042-B7A8-9060834982B6}"/>
+                <a16:creationId xmlns="" xmlns:a16="http://schemas.microsoft.com/office/drawing/2014/main" id="{6857E332-9933-9042-B7A8-9060834982B6}"/>
               </a:ext>
             </a:extLst>
           </p:cNvPr>
@@ -3475,7 +6326,7 @@
           <p:cNvPr id="14" name="文本框 6">
             <a:extLst>
               <a:ext uri="{FF2B5EF4-FFF2-40B4-BE49-F238E27FC236}">
-                <a16:creationId xmlns:a16="http://schemas.microsoft.com/office/drawing/2014/main" xmlns="" id="{9708D859-D292-E44F-97EB-598216544539}"/>
+                <a16:creationId xmlns="" xmlns:a16="http://schemas.microsoft.com/office/drawing/2014/main" id="{9708D859-D292-E44F-97EB-598216544539}"/>
               </a:ext>
             </a:extLst>
           </p:cNvPr>
@@ -3525,7 +6376,7 @@
           <p:cNvPr id="15" name="文本占位符 3">
             <a:extLst>
               <a:ext uri="{FF2B5EF4-FFF2-40B4-BE49-F238E27FC236}">
-                <a16:creationId xmlns:a16="http://schemas.microsoft.com/office/drawing/2014/main" xmlns="" id="{61048211-379D-CD4C-8037-C4240B243345}"/>
+                <a16:creationId xmlns="" xmlns:a16="http://schemas.microsoft.com/office/drawing/2014/main" id="{61048211-379D-CD4C-8037-C4240B243345}"/>
               </a:ext>
             </a:extLst>
           </p:cNvPr>
@@ -3745,7 +6596,7 @@
         </p:nvSpPr>
         <p:spPr>
           <a:xfrm>
-            <a:off x="2784001" y="314124"/>
+            <a:off x="2784001" y="342700"/>
             <a:ext cx="1624714" cy="523220"/>
           </a:xfrm>
           <a:prstGeom prst="rect">
@@ -4259,7 +7110,7 @@
         <p:spPr>
           <a:xfrm>
             <a:off x="1056000" y="220689"/>
-            <a:ext cx="1728000" cy="523220"/>
+            <a:ext cx="1584000" cy="523220"/>
           </a:xfrm>
           <a:prstGeom prst="rect">
             <a:avLst/>
@@ -4271,7 +7122,7 @@
             <a:lvl1pPr marL="0" indent="0">
               <a:buFontTx/>
               <a:buNone/>
-              <a:defRPr sz="3600" b="0" i="0">
+              <a:defRPr sz="3200" b="0" i="0">
                 <a:solidFill>
                   <a:srgbClr val="ECFAFF"/>
                 </a:solidFill>
@@ -4315,8 +7166,8 @@
         </p:nvSpPr>
         <p:spPr>
           <a:xfrm>
-            <a:off x="2784001" y="220689"/>
-            <a:ext cx="1624714" cy="523220"/>
+            <a:off x="2784001" y="265754"/>
+            <a:ext cx="1584000" cy="461665"/>
           </a:xfrm>
           <a:prstGeom prst="rect">
             <a:avLst/>
@@ -4330,7 +7181,7 @@
           <a:lstStyle/>
           <a:p>
             <a:r>
-              <a:rPr kumimoji="1" lang="zh-CN" altLang="en-US" sz="2800" b="0" i="0" dirty="0">
+              <a:rPr kumimoji="1" lang="zh-CN" altLang="en-US" sz="2400" b="0" i="0" dirty="0">
                 <a:solidFill>
                   <a:srgbClr val="ECFAFF"/>
                 </a:solidFill>
@@ -4355,7 +7206,7 @@
         </p:nvSpPr>
         <p:spPr>
           <a:xfrm>
-            <a:off x="4408715" y="220689"/>
+            <a:off x="4137253" y="220689"/>
             <a:ext cx="1152000" cy="523220"/>
           </a:xfrm>
           <a:prstGeom prst="rect">
@@ -4368,7 +7219,7 @@
             <a:lvl1pPr marL="0" indent="0">
               <a:buFontTx/>
               <a:buNone/>
-              <a:defRPr sz="3600" b="0" i="0">
+              <a:defRPr sz="3200" b="0" i="0">
                 <a:solidFill>
                   <a:srgbClr val="ECFAFF"/>
                 </a:solidFill>
@@ -4529,7 +7380,7 @@
           <p:cNvPr id="16" name="文本占位符 3">
             <a:extLst>
               <a:ext uri="{FF2B5EF4-FFF2-40B4-BE49-F238E27FC236}">
-                <a16:creationId xmlns="" xmlns:a16="http://schemas.microsoft.com/office/drawing/2014/main" id="{A74FB077-6AA3-0B43-AC21-EE33C7C61E10}"/>
+                <a16:creationId xmlns:a16="http://schemas.microsoft.com/office/drawing/2014/main" xmlns="" id="{A74FB077-6AA3-0B43-AC21-EE33C7C61E10}"/>
               </a:ext>
             </a:extLst>
           </p:cNvPr>
@@ -4612,7 +7463,7 @@
           <p:cNvPr id="17" name="文本占位符 3">
             <a:extLst>
               <a:ext uri="{FF2B5EF4-FFF2-40B4-BE49-F238E27FC236}">
-                <a16:creationId xmlns="" xmlns:a16="http://schemas.microsoft.com/office/drawing/2014/main" id="{AD89B8CD-8466-564E-98F9-0FDFC2E5A77B}"/>
+                <a16:creationId xmlns:a16="http://schemas.microsoft.com/office/drawing/2014/main" xmlns="" id="{AD89B8CD-8466-564E-98F9-0FDFC2E5A77B}"/>
               </a:ext>
             </a:extLst>
           </p:cNvPr>
@@ -4701,7 +7552,7 @@
           <p:cNvPr id="18" name="文本占位符 3">
             <a:extLst>
               <a:ext uri="{FF2B5EF4-FFF2-40B4-BE49-F238E27FC236}">
-                <a16:creationId xmlns="" xmlns:a16="http://schemas.microsoft.com/office/drawing/2014/main" id="{DC7420E9-D400-EC49-BA07-FADE6C3CD450}"/>
+                <a16:creationId xmlns:a16="http://schemas.microsoft.com/office/drawing/2014/main" xmlns="" id="{DC7420E9-D400-EC49-BA07-FADE6C3CD450}"/>
               </a:ext>
             </a:extLst>
           </p:cNvPr>
@@ -4790,7 +7641,7 @@
           <p:cNvPr id="19" name="文本占位符 3">
             <a:extLst>
               <a:ext uri="{FF2B5EF4-FFF2-40B4-BE49-F238E27FC236}">
-                <a16:creationId xmlns="" xmlns:a16="http://schemas.microsoft.com/office/drawing/2014/main" id="{911556EF-2E53-D44E-B558-5C114F0FAA7C}"/>
+                <a16:creationId xmlns:a16="http://schemas.microsoft.com/office/drawing/2014/main" xmlns="" id="{911556EF-2E53-D44E-B558-5C114F0FAA7C}"/>
               </a:ext>
             </a:extLst>
           </p:cNvPr>
@@ -4879,7 +7730,7 @@
           <p:cNvPr id="20" name="文本框 6">
             <a:extLst>
               <a:ext uri="{FF2B5EF4-FFF2-40B4-BE49-F238E27FC236}">
-                <a16:creationId xmlns="" xmlns:a16="http://schemas.microsoft.com/office/drawing/2014/main" id="{5D38C703-0535-2649-B4A0-B8F05CF7B2C5}"/>
+                <a16:creationId xmlns:a16="http://schemas.microsoft.com/office/drawing/2014/main" xmlns="" id="{5D38C703-0535-2649-B4A0-B8F05CF7B2C5}"/>
               </a:ext>
             </a:extLst>
           </p:cNvPr>
@@ -4929,7 +7780,7 @@
           <p:cNvPr id="21" name="文本框 6">
             <a:extLst>
               <a:ext uri="{FF2B5EF4-FFF2-40B4-BE49-F238E27FC236}">
-                <a16:creationId xmlns="" xmlns:a16="http://schemas.microsoft.com/office/drawing/2014/main" id="{65E5CD98-D6C1-1848-86A2-A50598B55139}"/>
+                <a16:creationId xmlns:a16="http://schemas.microsoft.com/office/drawing/2014/main" xmlns="" id="{65E5CD98-D6C1-1848-86A2-A50598B55139}"/>
               </a:ext>
             </a:extLst>
           </p:cNvPr>
@@ -4979,7 +7830,7 @@
           <p:cNvPr id="22" name="文本框 6">
             <a:extLst>
               <a:ext uri="{FF2B5EF4-FFF2-40B4-BE49-F238E27FC236}">
-                <a16:creationId xmlns="" xmlns:a16="http://schemas.microsoft.com/office/drawing/2014/main" id="{5F9E940D-7090-E94B-8B49-5CA1D127071A}"/>
+                <a16:creationId xmlns:a16="http://schemas.microsoft.com/office/drawing/2014/main" xmlns="" id="{5F9E940D-7090-E94B-8B49-5CA1D127071A}"/>
               </a:ext>
             </a:extLst>
           </p:cNvPr>
@@ -5029,7 +7880,7 @@
           <p:cNvPr id="23" name="文本框 6">
             <a:extLst>
               <a:ext uri="{FF2B5EF4-FFF2-40B4-BE49-F238E27FC236}">
-                <a16:creationId xmlns="" xmlns:a16="http://schemas.microsoft.com/office/drawing/2014/main" id="{BB9196A1-74E2-5046-99D0-EB0B468753EC}"/>
+                <a16:creationId xmlns:a16="http://schemas.microsoft.com/office/drawing/2014/main" xmlns="" id="{BB9196A1-74E2-5046-99D0-EB0B468753EC}"/>
               </a:ext>
             </a:extLst>
           </p:cNvPr>
@@ -5079,7 +7930,7 @@
           <p:cNvPr id="24" name="文本占位符 8">
             <a:extLst>
               <a:ext uri="{FF2B5EF4-FFF2-40B4-BE49-F238E27FC236}">
-                <a16:creationId xmlns="" xmlns:a16="http://schemas.microsoft.com/office/drawing/2014/main" id="{DC4E8E34-3460-3444-B72A-429476C3F597}"/>
+                <a16:creationId xmlns:a16="http://schemas.microsoft.com/office/drawing/2014/main" xmlns="" id="{DC4E8E34-3460-3444-B72A-429476C3F597}"/>
               </a:ext>
             </a:extLst>
           </p:cNvPr>
@@ -5145,7 +7996,7 @@
           <p:cNvPr id="25" name="文本占位符 8">
             <a:extLst>
               <a:ext uri="{FF2B5EF4-FFF2-40B4-BE49-F238E27FC236}">
-                <a16:creationId xmlns="" xmlns:a16="http://schemas.microsoft.com/office/drawing/2014/main" id="{993DB0B2-65A6-8C4E-BC99-5DD87B1ACE41}"/>
+                <a16:creationId xmlns:a16="http://schemas.microsoft.com/office/drawing/2014/main" xmlns="" id="{993DB0B2-65A6-8C4E-BC99-5DD87B1ACE41}"/>
               </a:ext>
             </a:extLst>
           </p:cNvPr>
@@ -5214,7 +8065,7 @@
           <p:cNvPr id="26" name="文本占位符 12">
             <a:extLst>
               <a:ext uri="{FF2B5EF4-FFF2-40B4-BE49-F238E27FC236}">
-                <a16:creationId xmlns="" xmlns:a16="http://schemas.microsoft.com/office/drawing/2014/main" id="{C20C845D-B437-B644-A0DC-11B9DDD011BE}"/>
+                <a16:creationId xmlns:a16="http://schemas.microsoft.com/office/drawing/2014/main" xmlns="" id="{C20C845D-B437-B644-A0DC-11B9DDD011BE}"/>
               </a:ext>
             </a:extLst>
           </p:cNvPr>
@@ -5662,8 +8513,8 @@
         </p:nvSpPr>
         <p:spPr>
           <a:xfrm>
-            <a:off x="1749233" y="2015609"/>
-            <a:ext cx="8693535" cy="1611852"/>
+            <a:off x="4464784" y="3381422"/>
+            <a:ext cx="3262432" cy="597536"/>
           </a:xfrm>
           <a:prstGeom prst="rect">
             <a:avLst/>
@@ -5677,7 +8528,7 @@
           <a:p>
             <a:pPr marL="0" marR="0" indent="0" algn="ctr" defTabSz="914400" rtl="0" eaLnBrk="1" fontAlgn="auto" latinLnBrk="0" hangingPunct="1">
               <a:lnSpc>
-                <a:spcPct val="120000"/>
+                <a:spcPct val="150000"/>
               </a:lnSpc>
               <a:spcBef>
                 <a:spcPts val="0"/>
@@ -5693,79 +8544,57 @@
               <a:defRPr/>
             </a:pPr>
             <a:r>
-              <a:rPr lang="es-ES_tradnl" altLang="zh-CN" sz="4800" b="0" i="0" dirty="0" err="1" smtClean="0">
+              <a:rPr lang="zh-CN" altLang="en-US" sz="2400" b="0" i="0" dirty="0" smtClean="0">
                 <a:solidFill>
                   <a:srgbClr val="ECFAFF"/>
                 </a:solidFill>
                 <a:effectLst/>
-                <a:latin typeface="Helvetica Neue Medium" panose="02000503000000020004" pitchFamily="2" charset="0"/>
-                <a:ea typeface="Helvetica Neue Medium" panose="02000503000000020004" pitchFamily="2" charset="0"/>
-                <a:cs typeface="Helvetica Neue Medium" panose="02000503000000020004" pitchFamily="2" charset="0"/>
+                <a:latin typeface="PingFang SC" charset="-122"/>
+                <a:ea typeface="PingFang SC" charset="-122"/>
+                <a:cs typeface="PingFang SC" charset="-122"/>
               </a:rPr>
-              <a:t>Calculating</a:t>
-            </a:r>
-            <a:r>
-              <a:rPr lang="es-ES_tradnl" altLang="zh-CN" sz="4800" b="0" i="0" dirty="0" smtClean="0">
+              <a:t>正在</a:t>
+            </a:r>
+            <a:r>
+              <a:rPr lang="zh-CN" altLang="en-US" sz="2400" b="0" i="0" dirty="0">
                 <a:solidFill>
                   <a:srgbClr val="ECFAFF"/>
                 </a:solidFill>
                 <a:effectLst/>
-                <a:latin typeface="Helvetica Neue Medium" panose="02000503000000020004" pitchFamily="2" charset="0"/>
-                <a:ea typeface="Helvetica Neue Medium" panose="02000503000000020004" pitchFamily="2" charset="0"/>
-                <a:cs typeface="Helvetica Neue Medium" panose="02000503000000020004" pitchFamily="2" charset="0"/>
+                <a:latin typeface="PingFang SC" charset="-122"/>
+                <a:ea typeface="PingFang SC" charset="-122"/>
+                <a:cs typeface="PingFang SC" charset="-122"/>
               </a:rPr>
-              <a:t> score, </a:t>
-            </a:r>
-            <a:r>
-              <a:rPr lang="es-ES_tradnl" altLang="zh-CN" sz="4800" b="0" i="0" dirty="0" err="1" smtClean="0">
-                <a:solidFill>
-                  <a:srgbClr val="ECFAFF"/>
-                </a:solidFill>
-                <a:effectLst/>
-                <a:latin typeface="Helvetica Neue Medium" panose="02000503000000020004" pitchFamily="2" charset="0"/>
-                <a:ea typeface="Helvetica Neue Medium" panose="02000503000000020004" pitchFamily="2" charset="0"/>
-                <a:cs typeface="Helvetica Neue Medium" panose="02000503000000020004" pitchFamily="2" charset="0"/>
-              </a:rPr>
-              <a:t>please</a:t>
-            </a:r>
-            <a:r>
-              <a:rPr lang="es-ES_tradnl" altLang="zh-CN" sz="4800" b="0" i="0" dirty="0" smtClean="0">
-                <a:solidFill>
-                  <a:srgbClr val="ECFAFF"/>
-                </a:solidFill>
-                <a:effectLst/>
-                <a:latin typeface="Helvetica Neue Medium" panose="02000503000000020004" pitchFamily="2" charset="0"/>
-                <a:ea typeface="Helvetica Neue Medium" panose="02000503000000020004" pitchFamily="2" charset="0"/>
-                <a:cs typeface="Helvetica Neue Medium" panose="02000503000000020004" pitchFamily="2" charset="0"/>
-              </a:rPr>
-              <a:t> </a:t>
-            </a:r>
-            <a:r>
-              <a:rPr lang="es-ES_tradnl" altLang="zh-CN" sz="4800" b="0" i="0" dirty="0" err="1" smtClean="0">
-                <a:solidFill>
-                  <a:srgbClr val="ECFAFF"/>
-                </a:solidFill>
-                <a:effectLst/>
-                <a:latin typeface="Helvetica Neue Medium" panose="02000503000000020004" pitchFamily="2" charset="0"/>
-                <a:ea typeface="Helvetica Neue Medium" panose="02000503000000020004" pitchFamily="2" charset="0"/>
-                <a:cs typeface="Helvetica Neue Medium" panose="02000503000000020004" pitchFamily="2" charset="0"/>
-              </a:rPr>
-              <a:t>wait</a:t>
-            </a:r>
-            <a:endParaRPr lang="es-ES_tradnl" altLang="zh-CN" sz="4800" b="0" i="0" dirty="0" smtClean="0">
-              <a:solidFill>
-                <a:srgbClr val="ECFAFF"/>
-              </a:solidFill>
-              <a:effectLst/>
-              <a:latin typeface="Helvetica Neue Medium" panose="02000503000000020004" pitchFamily="2" charset="0"/>
-              <a:ea typeface="Helvetica Neue Medium" panose="02000503000000020004" pitchFamily="2" charset="0"/>
-              <a:cs typeface="Helvetica Neue Medium" panose="02000503000000020004" pitchFamily="2" charset="0"/>
-            </a:endParaRPr>
-          </a:p>
-          <a:p>
-            <a:pPr marL="0" marR="0" indent="0" algn="ctr" defTabSz="914400" rtl="0" eaLnBrk="1" fontAlgn="auto" latinLnBrk="0" hangingPunct="1">
-              <a:lnSpc>
-                <a:spcPct val="120000"/>
+              <a:t>计算分数，请稍后</a:t>
+            </a:r>
+          </a:p>
+        </p:txBody>
+      </p:sp>
+      <p:sp>
+        <p:nvSpPr>
+          <p:cNvPr id="4" name="文本占位符 3"/>
+          <p:cNvSpPr>
+            <a:spLocks noGrp="1"/>
+          </p:cNvSpPr>
+          <p:nvPr>
+            <p:ph type="body" sz="quarter" idx="10" hasCustomPrompt="1"/>
+          </p:nvPr>
+        </p:nvSpPr>
+        <p:spPr>
+          <a:xfrm>
+            <a:off x="336000" y="1032044"/>
+            <a:ext cx="11520000" cy="2160000"/>
+          </a:xfrm>
+          <a:prstGeom prst="rect">
+            <a:avLst/>
+          </a:prstGeom>
+        </p:spPr>
+        <p:txBody>
+          <a:bodyPr anchor="b" anchorCtr="0"/>
+          <a:lstStyle>
+            <a:lvl1pPr marL="0" marR="0" indent="0" algn="ctr" defTabSz="914400" rtl="0" eaLnBrk="1" fontAlgn="auto" latinLnBrk="0" hangingPunct="1">
+              <a:lnSpc>
+                <a:spcPct val="150000"/>
               </a:lnSpc>
               <a:spcBef>
                 <a:spcPts val="0"/>
@@ -5778,31 +8607,85 @@
               <a:buFontTx/>
               <a:buNone/>
               <a:tabLst/>
+              <a:defRPr sz="4400" b="1">
+                <a:solidFill>
+                  <a:srgbClr val="ECFAFF"/>
+                </a:solidFill>
+                <a:latin typeface="PingFang SC" charset="-122"/>
+                <a:ea typeface="PingFang SC" charset="-122"/>
+                <a:cs typeface="PingFang SC" charset="-122"/>
+              </a:defRPr>
+            </a:lvl1pPr>
+            <a:lvl2pPr marL="457200" indent="0" algn="ctr">
+              <a:lnSpc>
+                <a:spcPct val="120000"/>
+              </a:lnSpc>
+              <a:buFontTx/>
+              <a:buNone/>
+              <a:defRPr sz="4000">
+                <a:latin typeface="PingFang SC" charset="-122"/>
+                <a:ea typeface="PingFang SC" charset="-122"/>
+                <a:cs typeface="PingFang SC" charset="-122"/>
+              </a:defRPr>
+            </a:lvl2pPr>
+            <a:lvl3pPr marL="914400" indent="0" algn="ctr">
+              <a:lnSpc>
+                <a:spcPct val="120000"/>
+              </a:lnSpc>
+              <a:buFontTx/>
+              <a:buNone/>
+              <a:defRPr sz="4000">
+                <a:latin typeface="PingFang SC" charset="-122"/>
+                <a:ea typeface="PingFang SC" charset="-122"/>
+                <a:cs typeface="PingFang SC" charset="-122"/>
+              </a:defRPr>
+            </a:lvl3pPr>
+            <a:lvl4pPr marL="1371600" indent="0" algn="ctr">
+              <a:lnSpc>
+                <a:spcPct val="120000"/>
+              </a:lnSpc>
+              <a:buFontTx/>
+              <a:buNone/>
+              <a:defRPr sz="4000">
+                <a:latin typeface="PingFang SC" charset="-122"/>
+                <a:ea typeface="PingFang SC" charset="-122"/>
+                <a:cs typeface="PingFang SC" charset="-122"/>
+              </a:defRPr>
+            </a:lvl4pPr>
+            <a:lvl5pPr marL="1828800" indent="0" algn="ctr">
+              <a:lnSpc>
+                <a:spcPct val="120000"/>
+              </a:lnSpc>
+              <a:buFontTx/>
+              <a:buNone/>
+              <a:defRPr sz="4000">
+                <a:latin typeface="PingFang SC" charset="-122"/>
+                <a:ea typeface="PingFang SC" charset="-122"/>
+                <a:cs typeface="PingFang SC" charset="-122"/>
+              </a:defRPr>
+            </a:lvl5pPr>
+          </a:lstStyle>
+          <a:p>
+            <a:pPr marL="0" marR="0" lvl="0" indent="0" algn="ctr" defTabSz="914400" rtl="0" eaLnBrk="1" fontAlgn="auto" latinLnBrk="0" hangingPunct="1">
+              <a:lnSpc>
+                <a:spcPct val="150000"/>
+              </a:lnSpc>
+              <a:spcBef>
+                <a:spcPts val="0"/>
+              </a:spcBef>
+              <a:spcAft>
+                <a:spcPts val="0"/>
+              </a:spcAft>
+              <a:buClrTx/>
+              <a:buSzTx/>
+              <a:buFontTx/>
+              <a:buNone/>
+              <a:tabLst/>
               <a:defRPr/>
             </a:pPr>
             <a:r>
-              <a:rPr lang="zh-CN" altLang="en-US" sz="3600" b="0" i="0" dirty="0" smtClean="0">
-                <a:solidFill>
-                  <a:srgbClr val="ECFAFF"/>
-                </a:solidFill>
-                <a:effectLst/>
-                <a:latin typeface="PingFang SC" charset="-122"/>
-                <a:ea typeface="PingFang SC" charset="-122"/>
-                <a:cs typeface="PingFang SC" charset="-122"/>
-              </a:rPr>
-              <a:t>正在</a:t>
-            </a:r>
-            <a:r>
-              <a:rPr lang="zh-CN" altLang="en-US" sz="3600" b="0" i="0" dirty="0">
-                <a:solidFill>
-                  <a:srgbClr val="ECFAFF"/>
-                </a:solidFill>
-                <a:effectLst/>
-                <a:latin typeface="PingFang SC" charset="-122"/>
-                <a:ea typeface="PingFang SC" charset="-122"/>
-                <a:cs typeface="PingFang SC" charset="-122"/>
-              </a:rPr>
-              <a:t>计算分数，请稍后</a:t>
+              <a:rPr kumimoji="1" lang="en-US" altLang="zh-CN" dirty="0" smtClean="0"/>
+              <a:t>Calculating score, please wait</a:t>
             </a:r>
           </a:p>
         </p:txBody>
@@ -5849,8 +8732,8 @@
         </p:nvSpPr>
         <p:spPr>
           <a:xfrm>
-            <a:off x="966000" y="1296619"/>
-            <a:ext cx="10260000" cy="1332000"/>
+            <a:off x="1776000" y="1090343"/>
+            <a:ext cx="8640000" cy="1332000"/>
           </a:xfrm>
           <a:prstGeom prst="rect">
             <a:avLst/>
@@ -5930,20 +8813,32 @@
         </p:nvSpPr>
         <p:spPr>
           <a:xfrm>
-            <a:off x="966788" y="2825382"/>
-            <a:ext cx="10258425" cy="504000"/>
-          </a:xfrm>
-          <a:prstGeom prst="rect">
-            <a:avLst/>
-          </a:prstGeom>
-        </p:spPr>
-        <p:txBody>
-          <a:bodyPr/>
+            <a:off x="1776000" y="2618992"/>
+            <a:ext cx="8640000" cy="1141175"/>
+          </a:xfrm>
+          <a:prstGeom prst="rect">
+            <a:avLst/>
+          </a:prstGeom>
+        </p:spPr>
+        <p:txBody>
+          <a:bodyPr anchor="ctr"/>
           <a:lstStyle>
-            <a:lvl1pPr marL="0" indent="0" algn="ctr">
-              <a:buFontTx/>
-              <a:buNone/>
-              <a:defRPr>
+            <a:lvl1pPr marL="0" marR="0" indent="0" algn="ctr" defTabSz="914400" rtl="0" eaLnBrk="1" fontAlgn="auto" latinLnBrk="0" hangingPunct="1">
+              <a:lnSpc>
+                <a:spcPct val="120000"/>
+              </a:lnSpc>
+              <a:spcBef>
+                <a:spcPts val="1000"/>
+              </a:spcBef>
+              <a:spcAft>
+                <a:spcPts val="0"/>
+              </a:spcAft>
+              <a:buClrTx/>
+              <a:buSzTx/>
+              <a:buFontTx/>
+              <a:buNone/>
+              <a:tabLst/>
+              <a:defRPr sz="2400">
                 <a:solidFill>
                   <a:srgbClr val="ECFAFF"/>
                 </a:solidFill>
@@ -6004,10 +8899,10 @@
           <a:p>
             <a:pPr lvl="0"/>
             <a:r>
-              <a:rPr kumimoji="1" lang="zh-CN" altLang="en-US" smtClean="0"/>
+              <a:rPr kumimoji="1" lang="zh-CN" altLang="en-US" dirty="0" smtClean="0"/>
               <a:t>非常棒</a:t>
             </a:r>
-            <a:endParaRPr kumimoji="1" lang="zh-CN" altLang="en-US" dirty="0"/>
+            <a:endParaRPr kumimoji="1" lang="en-US" altLang="zh-CN" dirty="0" smtClean="0"/>
           </a:p>
         </p:txBody>
       </p:sp>
@@ -6023,7 +8918,7 @@
         </p:nvSpPr>
         <p:spPr>
           <a:xfrm>
-            <a:off x="5376000" y="3743325"/>
+            <a:off x="5376000" y="4406274"/>
             <a:ext cx="1440000" cy="514350"/>
           </a:xfrm>
           <a:prstGeom prst="rect">
@@ -6127,7 +9022,7 @@
         </p:nvSpPr>
         <p:spPr>
           <a:xfrm>
-            <a:off x="4872000" y="3546676"/>
+            <a:off x="4872000" y="4209625"/>
             <a:ext cx="2448000" cy="1296000"/>
           </a:xfrm>
           <a:prstGeom prst="roundRect">
@@ -6178,7 +9073,7 @@
         </p:nvSpPr>
         <p:spPr>
           <a:xfrm>
-            <a:off x="5641775" y="4222165"/>
+            <a:off x="5641775" y="4885114"/>
             <a:ext cx="908450" cy="461665"/>
           </a:xfrm>
           <a:prstGeom prst="rect">
@@ -6254,7 +9149,7 @@
           <p:nvPr userDrawn="1"/>
         </p:nvPicPr>
         <p:blipFill>
-          <a:blip r:embed="rId13">
+          <a:blip r:embed="rId15">
             <a:alphaModFix amt="50000"/>
             <a:extLst>
               <a:ext uri="{28A0092B-C50C-407E-A947-70E740481C1C}">
@@ -6297,6 +9192,8 @@
     <p:sldLayoutId id="2147483655" r:id="rId9"/>
     <p:sldLayoutId id="2147483662" r:id="rId10"/>
     <p:sldLayoutId id="2147483665" r:id="rId11"/>
+    <p:sldLayoutId id="2147483668" r:id="rId12"/>
+    <p:sldLayoutId id="2147483667" r:id="rId13"/>
   </p:sldLayoutIdLst>
   <p:txStyles>
     <p:titleStyle>

</xml_diff>